<commit_message>
18-02-2025, Organization and schedule update
</commit_message>
<xml_diff>
--- a/2024-2025/AY_20242025_MTYPBoard.pptx
+++ b/2024-2025/AY_20242025_MTYPBoard.pptx
@@ -7,6 +7,7 @@
   <p:sldIdLst>
     <p:sldId id="256" r:id="rId2"/>
     <p:sldId id="257" r:id="rId3"/>
+    <p:sldId id="258" r:id="rId4"/>
   </p:sldIdLst>
   <p:sldSz cx="12192000" cy="6858000"/>
   <p:notesSz cx="6858000" cy="9144000"/>
@@ -273,7 +274,7 @@
           <a:p>
             <a:fld id="{C097A795-FB6F-4A98-AB17-A12F1A28627D}" type="datetimeFigureOut">
               <a:rPr lang="nl-NL" smtClean="0"/>
-              <a:t>5-10-2024</a:t>
+              <a:t>17-2-2025</a:t>
             </a:fld>
             <a:endParaRPr lang="nl-NL"/>
           </a:p>
@@ -473,7 +474,7 @@
           <a:p>
             <a:fld id="{C097A795-FB6F-4A98-AB17-A12F1A28627D}" type="datetimeFigureOut">
               <a:rPr lang="nl-NL" smtClean="0"/>
-              <a:t>5-10-2024</a:t>
+              <a:t>17-2-2025</a:t>
             </a:fld>
             <a:endParaRPr lang="nl-NL"/>
           </a:p>
@@ -683,7 +684,7 @@
           <a:p>
             <a:fld id="{C097A795-FB6F-4A98-AB17-A12F1A28627D}" type="datetimeFigureOut">
               <a:rPr lang="nl-NL" smtClean="0"/>
-              <a:t>5-10-2024</a:t>
+              <a:t>17-2-2025</a:t>
             </a:fld>
             <a:endParaRPr lang="nl-NL"/>
           </a:p>
@@ -883,7 +884,7 @@
           <a:p>
             <a:fld id="{C097A795-FB6F-4A98-AB17-A12F1A28627D}" type="datetimeFigureOut">
               <a:rPr lang="nl-NL" smtClean="0"/>
-              <a:t>5-10-2024</a:t>
+              <a:t>17-2-2025</a:t>
             </a:fld>
             <a:endParaRPr lang="nl-NL"/>
           </a:p>
@@ -1159,7 +1160,7 @@
           <a:p>
             <a:fld id="{C097A795-FB6F-4A98-AB17-A12F1A28627D}" type="datetimeFigureOut">
               <a:rPr lang="nl-NL" smtClean="0"/>
-              <a:t>5-10-2024</a:t>
+              <a:t>17-2-2025</a:t>
             </a:fld>
             <a:endParaRPr lang="nl-NL"/>
           </a:p>
@@ -1427,7 +1428,7 @@
           <a:p>
             <a:fld id="{C097A795-FB6F-4A98-AB17-A12F1A28627D}" type="datetimeFigureOut">
               <a:rPr lang="nl-NL" smtClean="0"/>
-              <a:t>5-10-2024</a:t>
+              <a:t>17-2-2025</a:t>
             </a:fld>
             <a:endParaRPr lang="nl-NL"/>
           </a:p>
@@ -1842,7 +1843,7 @@
           <a:p>
             <a:fld id="{C097A795-FB6F-4A98-AB17-A12F1A28627D}" type="datetimeFigureOut">
               <a:rPr lang="nl-NL" smtClean="0"/>
-              <a:t>5-10-2024</a:t>
+              <a:t>17-2-2025</a:t>
             </a:fld>
             <a:endParaRPr lang="nl-NL"/>
           </a:p>
@@ -1984,7 +1985,7 @@
           <a:p>
             <a:fld id="{C097A795-FB6F-4A98-AB17-A12F1A28627D}" type="datetimeFigureOut">
               <a:rPr lang="nl-NL" smtClean="0"/>
-              <a:t>5-10-2024</a:t>
+              <a:t>17-2-2025</a:t>
             </a:fld>
             <a:endParaRPr lang="nl-NL"/>
           </a:p>
@@ -2097,7 +2098,7 @@
           <a:p>
             <a:fld id="{C097A795-FB6F-4A98-AB17-A12F1A28627D}" type="datetimeFigureOut">
               <a:rPr lang="nl-NL" smtClean="0"/>
-              <a:t>5-10-2024</a:t>
+              <a:t>17-2-2025</a:t>
             </a:fld>
             <a:endParaRPr lang="nl-NL"/>
           </a:p>
@@ -2410,7 +2411,7 @@
           <a:p>
             <a:fld id="{C097A795-FB6F-4A98-AB17-A12F1A28627D}" type="datetimeFigureOut">
               <a:rPr lang="nl-NL" smtClean="0"/>
-              <a:t>5-10-2024</a:t>
+              <a:t>17-2-2025</a:t>
             </a:fld>
             <a:endParaRPr lang="nl-NL"/>
           </a:p>
@@ -2699,7 +2700,7 @@
           <a:p>
             <a:fld id="{C097A795-FB6F-4A98-AB17-A12F1A28627D}" type="datetimeFigureOut">
               <a:rPr lang="nl-NL" smtClean="0"/>
-              <a:t>5-10-2024</a:t>
+              <a:t>17-2-2025</a:t>
             </a:fld>
             <a:endParaRPr lang="nl-NL"/>
           </a:p>
@@ -2942,7 +2943,7 @@
           <a:p>
             <a:fld id="{C097A795-FB6F-4A98-AB17-A12F1A28627D}" type="datetimeFigureOut">
               <a:rPr lang="nl-NL" smtClean="0"/>
-              <a:t>5-10-2024</a:t>
+              <a:t>17-2-2025</a:t>
             </a:fld>
             <a:endParaRPr lang="nl-NL"/>
           </a:p>
@@ -3993,6 +3994,2409 @@
 </p:sld>
 </file>
 
+<file path=ppt/slides/slide3.xml><?xml version="1.0" encoding="utf-8"?>
+<p:sld xmlns:a="http://schemas.openxmlformats.org/drawingml/2006/main" xmlns:r="http://schemas.openxmlformats.org/officeDocument/2006/relationships" xmlns:p="http://schemas.openxmlformats.org/presentationml/2006/main">
+  <p:cSld>
+    <p:spTree>
+      <p:nvGrpSpPr>
+        <p:cNvPr id="1" name="">
+          <a:extLst>
+            <a:ext uri="{FF2B5EF4-FFF2-40B4-BE49-F238E27FC236}">
+              <a16:creationId xmlns:a16="http://schemas.microsoft.com/office/drawing/2014/main" id="{797C87C9-8263-340C-AF33-35F382AF5F71}"/>
+            </a:ext>
+          </a:extLst>
+        </p:cNvPr>
+        <p:cNvGrpSpPr/>
+        <p:nvPr/>
+      </p:nvGrpSpPr>
+      <p:grpSpPr>
+        <a:xfrm>
+          <a:off x="0" y="0"/>
+          <a:ext cx="0" cy="0"/>
+          <a:chOff x="0" y="0"/>
+          <a:chExt cx="0" cy="0"/>
+        </a:xfrm>
+      </p:grpSpPr>
+      <p:grpSp>
+        <p:nvGrpSpPr>
+          <p:cNvPr id="1055" name="Gruppo 1054">
+            <a:extLst>
+              <a:ext uri="{FF2B5EF4-FFF2-40B4-BE49-F238E27FC236}">
+                <a16:creationId xmlns:a16="http://schemas.microsoft.com/office/drawing/2014/main" id="{D2538DC2-C8C0-3044-80B2-E9854FBA47FD}"/>
+              </a:ext>
+            </a:extLst>
+          </p:cNvPr>
+          <p:cNvGrpSpPr/>
+          <p:nvPr/>
+        </p:nvGrpSpPr>
+        <p:grpSpPr>
+          <a:xfrm>
+            <a:off x="1524000" y="0"/>
+            <a:ext cx="9144000" cy="6858000"/>
+            <a:chOff x="1524000" y="0"/>
+            <a:chExt cx="9144000" cy="6858000"/>
+          </a:xfrm>
+        </p:grpSpPr>
+        <p:grpSp>
+          <p:nvGrpSpPr>
+            <p:cNvPr id="20" name="Gruppo 19">
+              <a:extLst>
+                <a:ext uri="{FF2B5EF4-FFF2-40B4-BE49-F238E27FC236}">
+                  <a16:creationId xmlns:a16="http://schemas.microsoft.com/office/drawing/2014/main" id="{96536DEE-6F0D-91D7-DF73-DA0892F9A23C}"/>
+                </a:ext>
+              </a:extLst>
+            </p:cNvPr>
+            <p:cNvGrpSpPr/>
+            <p:nvPr/>
+          </p:nvGrpSpPr>
+          <p:grpSpPr>
+            <a:xfrm>
+              <a:off x="1524000" y="0"/>
+              <a:ext cx="9144000" cy="6858000"/>
+              <a:chOff x="1524000" y="0"/>
+              <a:chExt cx="9144000" cy="6858000"/>
+            </a:xfrm>
+          </p:grpSpPr>
+          <p:pic>
+            <p:nvPicPr>
+              <p:cNvPr id="5" name="Immagine 4" descr="Immagine che contiene vestiti, erba, aria aperta, cielo&#10;&#10;Descrizione generata automaticamente">
+                <a:extLst>
+                  <a:ext uri="{FF2B5EF4-FFF2-40B4-BE49-F238E27FC236}">
+                    <a16:creationId xmlns:a16="http://schemas.microsoft.com/office/drawing/2014/main" id="{6FCC59E9-0538-180D-D1EE-615F90F6013C}"/>
+                  </a:ext>
+                </a:extLst>
+              </p:cNvPr>
+              <p:cNvPicPr>
+                <a:picLocks noChangeAspect="1"/>
+              </p:cNvPicPr>
+              <p:nvPr/>
+            </p:nvPicPr>
+            <p:blipFill>
+              <a:blip r:embed="rId2">
+                <a:extLst>
+                  <a:ext uri="{28A0092B-C50C-407E-A947-70E740481C1C}">
+                    <a14:useLocalDpi xmlns:a14="http://schemas.microsoft.com/office/drawing/2010/main" val="0"/>
+                  </a:ext>
+                </a:extLst>
+              </a:blip>
+              <a:stretch>
+                <a:fillRect/>
+              </a:stretch>
+            </p:blipFill>
+            <p:spPr>
+              <a:xfrm>
+                <a:off x="1524000" y="0"/>
+                <a:ext cx="9144000" cy="6858000"/>
+              </a:xfrm>
+              <a:prstGeom prst="rect">
+                <a:avLst/>
+              </a:prstGeom>
+            </p:spPr>
+          </p:pic>
+          <p:sp>
+            <p:nvSpPr>
+              <p:cNvPr id="9" name="Rettangolo 8">
+                <a:extLst>
+                  <a:ext uri="{FF2B5EF4-FFF2-40B4-BE49-F238E27FC236}">
+                    <a16:creationId xmlns:a16="http://schemas.microsoft.com/office/drawing/2014/main" id="{FC48665C-F847-093B-5AD9-3A72F64E71FE}"/>
+                  </a:ext>
+                </a:extLst>
+              </p:cNvPr>
+              <p:cNvSpPr/>
+              <p:nvPr/>
+            </p:nvSpPr>
+            <p:spPr>
+              <a:xfrm>
+                <a:off x="5333841" y="2332576"/>
+                <a:ext cx="438309" cy="267758"/>
+              </a:xfrm>
+              <a:prstGeom prst="rect">
+                <a:avLst/>
+              </a:prstGeom>
+              <a:solidFill>
+                <a:srgbClr val="1B252E"/>
+              </a:solidFill>
+              <a:ln>
+                <a:noFill/>
+              </a:ln>
+            </p:spPr>
+            <p:style>
+              <a:lnRef idx="2">
+                <a:schemeClr val="accent1">
+                  <a:shade val="15000"/>
+                </a:schemeClr>
+              </a:lnRef>
+              <a:fillRef idx="1">
+                <a:schemeClr val="accent1"/>
+              </a:fillRef>
+              <a:effectRef idx="0">
+                <a:schemeClr val="accent1"/>
+              </a:effectRef>
+              <a:fontRef idx="minor">
+                <a:schemeClr val="lt1"/>
+              </a:fontRef>
+            </p:style>
+            <p:txBody>
+              <a:bodyPr rtlCol="0" anchor="ctr"/>
+              <a:lstStyle/>
+              <a:p>
+                <a:pPr algn="ctr"/>
+                <a:endParaRPr lang="nl-NL"/>
+              </a:p>
+            </p:txBody>
+          </p:sp>
+          <p:sp>
+            <p:nvSpPr>
+              <p:cNvPr id="10" name="Rettangolo 9">
+                <a:extLst>
+                  <a:ext uri="{FF2B5EF4-FFF2-40B4-BE49-F238E27FC236}">
+                    <a16:creationId xmlns:a16="http://schemas.microsoft.com/office/drawing/2014/main" id="{65194E23-4ECA-59FD-BA3E-DF45D84BA200}"/>
+                  </a:ext>
+                </a:extLst>
+              </p:cNvPr>
+              <p:cNvSpPr/>
+              <p:nvPr/>
+            </p:nvSpPr>
+            <p:spPr>
+              <a:xfrm>
+                <a:off x="5333842" y="2538743"/>
+                <a:ext cx="358934" cy="341590"/>
+              </a:xfrm>
+              <a:prstGeom prst="rect">
+                <a:avLst/>
+              </a:prstGeom>
+              <a:solidFill>
+                <a:srgbClr val="1B252E"/>
+              </a:solidFill>
+              <a:ln>
+                <a:noFill/>
+              </a:ln>
+            </p:spPr>
+            <p:style>
+              <a:lnRef idx="2">
+                <a:schemeClr val="accent1">
+                  <a:shade val="15000"/>
+                </a:schemeClr>
+              </a:lnRef>
+              <a:fillRef idx="1">
+                <a:schemeClr val="accent1"/>
+              </a:fillRef>
+              <a:effectRef idx="0">
+                <a:schemeClr val="accent1"/>
+              </a:effectRef>
+              <a:fontRef idx="minor">
+                <a:schemeClr val="lt1"/>
+              </a:fontRef>
+            </p:style>
+            <p:txBody>
+              <a:bodyPr rtlCol="0" anchor="ctr"/>
+              <a:lstStyle/>
+              <a:p>
+                <a:pPr algn="ctr"/>
+                <a:endParaRPr lang="nl-NL"/>
+              </a:p>
+            </p:txBody>
+          </p:sp>
+          <p:sp>
+            <p:nvSpPr>
+              <p:cNvPr id="11" name="Rettangolo 10">
+                <a:extLst>
+                  <a:ext uri="{FF2B5EF4-FFF2-40B4-BE49-F238E27FC236}">
+                    <a16:creationId xmlns:a16="http://schemas.microsoft.com/office/drawing/2014/main" id="{7249B5AA-1BE7-5AC6-2631-80D21D36FAC4}"/>
+                  </a:ext>
+                </a:extLst>
+              </p:cNvPr>
+              <p:cNvSpPr/>
+              <p:nvPr/>
+            </p:nvSpPr>
+            <p:spPr>
+              <a:xfrm>
+                <a:off x="5394167" y="2880333"/>
+                <a:ext cx="231934" cy="267758"/>
+              </a:xfrm>
+              <a:prstGeom prst="rect">
+                <a:avLst/>
+              </a:prstGeom>
+              <a:solidFill>
+                <a:srgbClr val="1B252E"/>
+              </a:solidFill>
+              <a:ln>
+                <a:noFill/>
+              </a:ln>
+            </p:spPr>
+            <p:style>
+              <a:lnRef idx="2">
+                <a:schemeClr val="accent1">
+                  <a:shade val="15000"/>
+                </a:schemeClr>
+              </a:lnRef>
+              <a:fillRef idx="1">
+                <a:schemeClr val="accent1"/>
+              </a:fillRef>
+              <a:effectRef idx="0">
+                <a:schemeClr val="accent1"/>
+              </a:effectRef>
+              <a:fontRef idx="minor">
+                <a:schemeClr val="lt1"/>
+              </a:fontRef>
+            </p:style>
+            <p:txBody>
+              <a:bodyPr rtlCol="0" anchor="ctr"/>
+              <a:lstStyle/>
+              <a:p>
+                <a:pPr algn="ctr"/>
+                <a:endParaRPr lang="nl-NL"/>
+              </a:p>
+            </p:txBody>
+          </p:sp>
+          <p:sp>
+            <p:nvSpPr>
+              <p:cNvPr id="12" name="Rettangolo 11">
+                <a:extLst>
+                  <a:ext uri="{FF2B5EF4-FFF2-40B4-BE49-F238E27FC236}">
+                    <a16:creationId xmlns:a16="http://schemas.microsoft.com/office/drawing/2014/main" id="{B04B9C62-BE02-8654-4E10-7589BE59DCB2}"/>
+                  </a:ext>
+                </a:extLst>
+              </p:cNvPr>
+              <p:cNvSpPr/>
+              <p:nvPr/>
+            </p:nvSpPr>
+            <p:spPr>
+              <a:xfrm>
+                <a:off x="5444967" y="3101976"/>
+                <a:ext cx="139857" cy="228600"/>
+              </a:xfrm>
+              <a:prstGeom prst="rect">
+                <a:avLst/>
+              </a:prstGeom>
+              <a:solidFill>
+                <a:srgbClr val="1B181F"/>
+              </a:solidFill>
+              <a:ln>
+                <a:noFill/>
+              </a:ln>
+            </p:spPr>
+            <p:style>
+              <a:lnRef idx="2">
+                <a:schemeClr val="accent1">
+                  <a:shade val="15000"/>
+                </a:schemeClr>
+              </a:lnRef>
+              <a:fillRef idx="1">
+                <a:schemeClr val="accent1"/>
+              </a:fillRef>
+              <a:effectRef idx="0">
+                <a:schemeClr val="accent1"/>
+              </a:effectRef>
+              <a:fontRef idx="minor">
+                <a:schemeClr val="lt1"/>
+              </a:fontRef>
+            </p:style>
+            <p:txBody>
+              <a:bodyPr rtlCol="0" anchor="ctr"/>
+              <a:lstStyle/>
+              <a:p>
+                <a:pPr algn="ctr"/>
+                <a:endParaRPr lang="nl-NL"/>
+              </a:p>
+            </p:txBody>
+          </p:sp>
+          <p:sp>
+            <p:nvSpPr>
+              <p:cNvPr id="13" name="Rettangolo 12">
+                <a:extLst>
+                  <a:ext uri="{FF2B5EF4-FFF2-40B4-BE49-F238E27FC236}">
+                    <a16:creationId xmlns:a16="http://schemas.microsoft.com/office/drawing/2014/main" id="{4A5FAFF7-EE2F-2044-D988-0C77EB8A0148}"/>
+                  </a:ext>
+                </a:extLst>
+              </p:cNvPr>
+              <p:cNvSpPr/>
+              <p:nvPr/>
+            </p:nvSpPr>
+            <p:spPr>
+              <a:xfrm rot="222067">
+                <a:off x="5451060" y="3339123"/>
+                <a:ext cx="114775" cy="69396"/>
+              </a:xfrm>
+              <a:prstGeom prst="rect">
+                <a:avLst/>
+              </a:prstGeom>
+              <a:solidFill>
+                <a:srgbClr val="92A6AF"/>
+              </a:solidFill>
+              <a:ln>
+                <a:noFill/>
+              </a:ln>
+            </p:spPr>
+            <p:style>
+              <a:lnRef idx="2">
+                <a:schemeClr val="accent1">
+                  <a:shade val="15000"/>
+                </a:schemeClr>
+              </a:lnRef>
+              <a:fillRef idx="1">
+                <a:schemeClr val="accent1"/>
+              </a:fillRef>
+              <a:effectRef idx="0">
+                <a:schemeClr val="accent1"/>
+              </a:effectRef>
+              <a:fontRef idx="minor">
+                <a:schemeClr val="lt1"/>
+              </a:fontRef>
+            </p:style>
+            <p:txBody>
+              <a:bodyPr rtlCol="0" anchor="ctr"/>
+              <a:lstStyle/>
+              <a:p>
+                <a:pPr algn="ctr"/>
+                <a:endParaRPr lang="nl-NL"/>
+              </a:p>
+            </p:txBody>
+          </p:sp>
+          <p:sp>
+            <p:nvSpPr>
+              <p:cNvPr id="15" name="Rettangolo 14">
+                <a:extLst>
+                  <a:ext uri="{FF2B5EF4-FFF2-40B4-BE49-F238E27FC236}">
+                    <a16:creationId xmlns:a16="http://schemas.microsoft.com/office/drawing/2014/main" id="{45370527-04B8-1DFA-7FEE-8FB2D272001E}"/>
+                  </a:ext>
+                </a:extLst>
+              </p:cNvPr>
+              <p:cNvSpPr/>
+              <p:nvPr/>
+            </p:nvSpPr>
+            <p:spPr>
+              <a:xfrm rot="818395">
+                <a:off x="5510962" y="2316253"/>
+                <a:ext cx="203130" cy="1013144"/>
+              </a:xfrm>
+              <a:prstGeom prst="rect">
+                <a:avLst/>
+              </a:prstGeom>
+              <a:solidFill>
+                <a:srgbClr val="1B252E"/>
+              </a:solidFill>
+              <a:ln>
+                <a:noFill/>
+              </a:ln>
+            </p:spPr>
+            <p:style>
+              <a:lnRef idx="2">
+                <a:schemeClr val="accent1">
+                  <a:shade val="15000"/>
+                </a:schemeClr>
+              </a:lnRef>
+              <a:fillRef idx="1">
+                <a:schemeClr val="accent1"/>
+              </a:fillRef>
+              <a:effectRef idx="0">
+                <a:schemeClr val="accent1"/>
+              </a:effectRef>
+              <a:fontRef idx="minor">
+                <a:schemeClr val="lt1"/>
+              </a:fontRef>
+            </p:style>
+            <p:txBody>
+              <a:bodyPr rtlCol="0" anchor="ctr"/>
+              <a:lstStyle/>
+              <a:p>
+                <a:pPr algn="ctr"/>
+                <a:endParaRPr lang="nl-NL"/>
+              </a:p>
+            </p:txBody>
+          </p:sp>
+          <p:sp>
+            <p:nvSpPr>
+              <p:cNvPr id="8" name="Rettangolo 7">
+                <a:extLst>
+                  <a:ext uri="{FF2B5EF4-FFF2-40B4-BE49-F238E27FC236}">
+                    <a16:creationId xmlns:a16="http://schemas.microsoft.com/office/drawing/2014/main" id="{0D2FA0BC-E392-6B94-32A5-41A7F7059C13}"/>
+                  </a:ext>
+                </a:extLst>
+              </p:cNvPr>
+              <p:cNvSpPr/>
+              <p:nvPr/>
+            </p:nvSpPr>
+            <p:spPr>
+              <a:xfrm rot="427096">
+                <a:off x="5234570" y="2226437"/>
+                <a:ext cx="617808" cy="130615"/>
+              </a:xfrm>
+              <a:prstGeom prst="rect">
+                <a:avLst/>
+              </a:prstGeom>
+              <a:solidFill>
+                <a:srgbClr val="A0B2BA"/>
+              </a:solidFill>
+              <a:ln>
+                <a:noFill/>
+              </a:ln>
+            </p:spPr>
+            <p:style>
+              <a:lnRef idx="2">
+                <a:schemeClr val="accent1">
+                  <a:shade val="15000"/>
+                </a:schemeClr>
+              </a:lnRef>
+              <a:fillRef idx="1">
+                <a:schemeClr val="accent1"/>
+              </a:fillRef>
+              <a:effectRef idx="0">
+                <a:schemeClr val="accent1"/>
+              </a:effectRef>
+              <a:fontRef idx="minor">
+                <a:schemeClr val="lt1"/>
+              </a:fontRef>
+            </p:style>
+            <p:txBody>
+              <a:bodyPr rtlCol="0" anchor="ctr"/>
+              <a:lstStyle/>
+              <a:p>
+                <a:pPr algn="ctr"/>
+                <a:endParaRPr lang="nl-NL"/>
+              </a:p>
+            </p:txBody>
+          </p:sp>
+          <p:sp>
+            <p:nvSpPr>
+              <p:cNvPr id="16" name="Rettangolo 15">
+                <a:extLst>
+                  <a:ext uri="{FF2B5EF4-FFF2-40B4-BE49-F238E27FC236}">
+                    <a16:creationId xmlns:a16="http://schemas.microsoft.com/office/drawing/2014/main" id="{A5F87532-E62E-EF65-510B-14094E9D76DA}"/>
+                  </a:ext>
+                </a:extLst>
+              </p:cNvPr>
+              <p:cNvSpPr/>
+              <p:nvPr/>
+            </p:nvSpPr>
+            <p:spPr>
+              <a:xfrm rot="624419">
+                <a:off x="6059394" y="2880822"/>
+                <a:ext cx="98978" cy="350214"/>
+              </a:xfrm>
+              <a:prstGeom prst="rect">
+                <a:avLst/>
+              </a:prstGeom>
+              <a:solidFill>
+                <a:srgbClr val="73949B"/>
+              </a:solidFill>
+              <a:ln>
+                <a:noFill/>
+              </a:ln>
+            </p:spPr>
+            <p:style>
+              <a:lnRef idx="2">
+                <a:schemeClr val="accent1">
+                  <a:shade val="15000"/>
+                </a:schemeClr>
+              </a:lnRef>
+              <a:fillRef idx="1">
+                <a:schemeClr val="accent1"/>
+              </a:fillRef>
+              <a:effectRef idx="0">
+                <a:schemeClr val="accent1"/>
+              </a:effectRef>
+              <a:fontRef idx="minor">
+                <a:schemeClr val="lt1"/>
+              </a:fontRef>
+            </p:style>
+            <p:txBody>
+              <a:bodyPr rtlCol="0" anchor="ctr"/>
+              <a:lstStyle/>
+              <a:p>
+                <a:pPr algn="ctr"/>
+                <a:endParaRPr lang="nl-NL"/>
+              </a:p>
+            </p:txBody>
+          </p:sp>
+          <p:cxnSp>
+            <p:nvCxnSpPr>
+              <p:cNvPr id="18" name="Connettore diritto 17">
+                <a:extLst>
+                  <a:ext uri="{FF2B5EF4-FFF2-40B4-BE49-F238E27FC236}">
+                    <a16:creationId xmlns:a16="http://schemas.microsoft.com/office/drawing/2014/main" id="{CDD3A9E3-541E-3F1A-69FA-13C3DE788962}"/>
+                  </a:ext>
+                </a:extLst>
+              </p:cNvPr>
+              <p:cNvCxnSpPr/>
+              <p:nvPr/>
+            </p:nvCxnSpPr>
+            <p:spPr>
+              <a:xfrm>
+                <a:off x="5216525" y="2268534"/>
+                <a:ext cx="641565" cy="79375"/>
+              </a:xfrm>
+              <a:prstGeom prst="line">
+                <a:avLst/>
+              </a:prstGeom>
+              <a:ln w="3175">
+                <a:solidFill>
+                  <a:srgbClr val="1B252E"/>
+                </a:solidFill>
+              </a:ln>
+            </p:spPr>
+            <p:style>
+              <a:lnRef idx="2">
+                <a:schemeClr val="accent1"/>
+              </a:lnRef>
+              <a:fillRef idx="0">
+                <a:schemeClr val="accent1"/>
+              </a:fillRef>
+              <a:effectRef idx="1">
+                <a:schemeClr val="accent1"/>
+              </a:effectRef>
+              <a:fontRef idx="minor">
+                <a:schemeClr val="tx1"/>
+              </a:fontRef>
+            </p:style>
+          </p:cxnSp>
+          <p:cxnSp>
+            <p:nvCxnSpPr>
+              <p:cNvPr id="19" name="Connettore diritto 18">
+                <a:extLst>
+                  <a:ext uri="{FF2B5EF4-FFF2-40B4-BE49-F238E27FC236}">
+                    <a16:creationId xmlns:a16="http://schemas.microsoft.com/office/drawing/2014/main" id="{96B20645-D37A-763D-B0F1-78B3B3BEBC1A}"/>
+                  </a:ext>
+                </a:extLst>
+              </p:cNvPr>
+              <p:cNvCxnSpPr/>
+              <p:nvPr/>
+            </p:nvCxnSpPr>
+            <p:spPr>
+              <a:xfrm>
+                <a:off x="5213565" y="2233498"/>
+                <a:ext cx="641565" cy="79375"/>
+              </a:xfrm>
+              <a:prstGeom prst="line">
+                <a:avLst/>
+              </a:prstGeom>
+              <a:ln w="3175">
+                <a:solidFill>
+                  <a:srgbClr val="1B252E"/>
+                </a:solidFill>
+              </a:ln>
+            </p:spPr>
+            <p:style>
+              <a:lnRef idx="2">
+                <a:schemeClr val="accent1"/>
+              </a:lnRef>
+              <a:fillRef idx="0">
+                <a:schemeClr val="accent1"/>
+              </a:fillRef>
+              <a:effectRef idx="1">
+                <a:schemeClr val="accent1"/>
+              </a:effectRef>
+              <a:fontRef idx="minor">
+                <a:schemeClr val="tx1"/>
+              </a:fontRef>
+            </p:style>
+          </p:cxnSp>
+        </p:grpSp>
+        <p:pic>
+          <p:nvPicPr>
+            <p:cNvPr id="4" name="Immagine 3">
+              <a:extLst>
+                <a:ext uri="{FF2B5EF4-FFF2-40B4-BE49-F238E27FC236}">
+                  <a16:creationId xmlns:a16="http://schemas.microsoft.com/office/drawing/2014/main" id="{855A8644-5AED-BBEA-4B64-203AC44396D9}"/>
+                </a:ext>
+              </a:extLst>
+            </p:cNvPr>
+            <p:cNvPicPr>
+              <a:picLocks noChangeAspect="1"/>
+            </p:cNvPicPr>
+            <p:nvPr/>
+          </p:nvPicPr>
+          <p:blipFill>
+            <a:blip r:embed="rId3">
+              <a:clrChange>
+                <a:clrFrom>
+                  <a:srgbClr val="FFFFFF"/>
+                </a:clrFrom>
+                <a:clrTo>
+                  <a:srgbClr val="FFFFFF">
+                    <a:alpha val="0"/>
+                  </a:srgbClr>
+                </a:clrTo>
+              </a:clrChange>
+            </a:blip>
+            <a:stretch>
+              <a:fillRect/>
+            </a:stretch>
+          </p:blipFill>
+          <p:spPr>
+            <a:xfrm>
+              <a:off x="6726211" y="3101976"/>
+              <a:ext cx="605921" cy="819272"/>
+            </a:xfrm>
+            <a:prstGeom prst="rect">
+              <a:avLst/>
+            </a:prstGeom>
+          </p:spPr>
+        </p:pic>
+        <p:pic>
+          <p:nvPicPr>
+            <p:cNvPr id="17" name="Immagine 16" descr="Immagine che contiene vestiti, erba, aria aperta, cielo&#10;&#10;Descrizione generata automaticamente">
+              <a:extLst>
+                <a:ext uri="{FF2B5EF4-FFF2-40B4-BE49-F238E27FC236}">
+                  <a16:creationId xmlns:a16="http://schemas.microsoft.com/office/drawing/2014/main" id="{30816724-D5B9-A711-9C69-A3D509B9A1F9}"/>
+                </a:ext>
+              </a:extLst>
+            </p:cNvPr>
+            <p:cNvPicPr>
+              <a:picLocks noChangeAspect="1"/>
+            </p:cNvPicPr>
+            <p:nvPr/>
+          </p:nvPicPr>
+          <p:blipFill>
+            <a:blip r:embed="rId2">
+              <a:extLst>
+                <a:ext uri="{28A0092B-C50C-407E-A947-70E740481C1C}">
+                  <a14:useLocalDpi xmlns:a14="http://schemas.microsoft.com/office/drawing/2010/main" val="0"/>
+                </a:ext>
+              </a:extLst>
+            </a:blip>
+            <a:srcRect l="56389" t="57283" r="41111" b="38643"/>
+            <a:stretch/>
+          </p:blipFill>
+          <p:spPr>
+            <a:xfrm rot="18155886">
+              <a:off x="7097708" y="3132851"/>
+              <a:ext cx="45719" cy="55879"/>
+            </a:xfrm>
+            <a:prstGeom prst="rect">
+              <a:avLst/>
+            </a:prstGeom>
+          </p:spPr>
+        </p:pic>
+        <p:pic>
+          <p:nvPicPr>
+            <p:cNvPr id="31" name="Immagine 30" descr="Immagine che contiene vestiti, erba, aria aperta, cielo&#10;&#10;Descrizione generata automaticamente">
+              <a:extLst>
+                <a:ext uri="{FF2B5EF4-FFF2-40B4-BE49-F238E27FC236}">
+                  <a16:creationId xmlns:a16="http://schemas.microsoft.com/office/drawing/2014/main" id="{D029212F-D97B-76CB-2432-E06EA3ECB862}"/>
+                </a:ext>
+              </a:extLst>
+            </p:cNvPr>
+            <p:cNvPicPr>
+              <a:picLocks noChangeAspect="1"/>
+            </p:cNvPicPr>
+            <p:nvPr/>
+          </p:nvPicPr>
+          <p:blipFill>
+            <a:blip r:embed="rId2">
+              <a:extLst>
+                <a:ext uri="{28A0092B-C50C-407E-A947-70E740481C1C}">
+                  <a14:useLocalDpi xmlns:a14="http://schemas.microsoft.com/office/drawing/2010/main" val="0"/>
+                </a:ext>
+              </a:extLst>
+            </a:blip>
+            <a:srcRect l="56389" t="57283" r="41111" b="38643"/>
+            <a:stretch/>
+          </p:blipFill>
+          <p:spPr>
+            <a:xfrm rot="18155886">
+              <a:off x="7133561" y="3154026"/>
+              <a:ext cx="45719" cy="55879"/>
+            </a:xfrm>
+            <a:prstGeom prst="rect">
+              <a:avLst/>
+            </a:prstGeom>
+          </p:spPr>
+        </p:pic>
+        <p:pic>
+          <p:nvPicPr>
+            <p:cNvPr id="32" name="Immagine 31" descr="Immagine che contiene vestiti, erba, aria aperta, cielo&#10;&#10;Descrizione generata automaticamente">
+              <a:extLst>
+                <a:ext uri="{FF2B5EF4-FFF2-40B4-BE49-F238E27FC236}">
+                  <a16:creationId xmlns:a16="http://schemas.microsoft.com/office/drawing/2014/main" id="{9106B170-5012-DC04-EB4F-5FD96BD6A577}"/>
+                </a:ext>
+              </a:extLst>
+            </p:cNvPr>
+            <p:cNvPicPr>
+              <a:picLocks noChangeAspect="1"/>
+            </p:cNvPicPr>
+            <p:nvPr/>
+          </p:nvPicPr>
+          <p:blipFill>
+            <a:blip r:embed="rId2">
+              <a:extLst>
+                <a:ext uri="{28A0092B-C50C-407E-A947-70E740481C1C}">
+                  <a14:useLocalDpi xmlns:a14="http://schemas.microsoft.com/office/drawing/2010/main" val="0"/>
+                </a:ext>
+              </a:extLst>
+            </a:blip>
+            <a:srcRect l="56389" t="57283" r="41111" b="38643"/>
+            <a:stretch/>
+          </p:blipFill>
+          <p:spPr>
+            <a:xfrm rot="20478371">
+              <a:off x="7169416" y="3183302"/>
+              <a:ext cx="45719" cy="55879"/>
+            </a:xfrm>
+            <a:prstGeom prst="rect">
+              <a:avLst/>
+            </a:prstGeom>
+          </p:spPr>
+        </p:pic>
+        <p:pic>
+          <p:nvPicPr>
+            <p:cNvPr id="33" name="Immagine 32" descr="Immagine che contiene vestiti, erba, aria aperta, cielo&#10;&#10;Descrizione generata automaticamente">
+              <a:extLst>
+                <a:ext uri="{FF2B5EF4-FFF2-40B4-BE49-F238E27FC236}">
+                  <a16:creationId xmlns:a16="http://schemas.microsoft.com/office/drawing/2014/main" id="{64062DEA-1302-CBD8-967D-147A5D2A33CC}"/>
+                </a:ext>
+              </a:extLst>
+            </p:cNvPr>
+            <p:cNvPicPr>
+              <a:picLocks noChangeAspect="1"/>
+            </p:cNvPicPr>
+            <p:nvPr/>
+          </p:nvPicPr>
+          <p:blipFill>
+            <a:blip r:embed="rId2">
+              <a:extLst>
+                <a:ext uri="{28A0092B-C50C-407E-A947-70E740481C1C}">
+                  <a14:useLocalDpi xmlns:a14="http://schemas.microsoft.com/office/drawing/2010/main" val="0"/>
+                </a:ext>
+              </a:extLst>
+            </a:blip>
+            <a:srcRect l="56389" t="57283" r="41111" b="38643"/>
+            <a:stretch/>
+          </p:blipFill>
+          <p:spPr>
+            <a:xfrm rot="20478371">
+              <a:off x="7193430" y="3217094"/>
+              <a:ext cx="45719" cy="55879"/>
+            </a:xfrm>
+            <a:prstGeom prst="rect">
+              <a:avLst/>
+            </a:prstGeom>
+          </p:spPr>
+        </p:pic>
+        <p:pic>
+          <p:nvPicPr>
+            <p:cNvPr id="34" name="Immagine 33" descr="Immagine che contiene vestiti, erba, aria aperta, cielo&#10;&#10;Descrizione generata automaticamente">
+              <a:extLst>
+                <a:ext uri="{FF2B5EF4-FFF2-40B4-BE49-F238E27FC236}">
+                  <a16:creationId xmlns:a16="http://schemas.microsoft.com/office/drawing/2014/main" id="{62532FFC-20CE-5E75-C6F4-9D8218EE996B}"/>
+                </a:ext>
+              </a:extLst>
+            </p:cNvPr>
+            <p:cNvPicPr>
+              <a:picLocks noChangeAspect="1"/>
+            </p:cNvPicPr>
+            <p:nvPr/>
+          </p:nvPicPr>
+          <p:blipFill>
+            <a:blip r:embed="rId2">
+              <a:extLst>
+                <a:ext uri="{28A0092B-C50C-407E-A947-70E740481C1C}">
+                  <a14:useLocalDpi xmlns:a14="http://schemas.microsoft.com/office/drawing/2010/main" val="0"/>
+                </a:ext>
+              </a:extLst>
+            </a:blip>
+            <a:srcRect l="56389" t="57283" r="41111" b="38643"/>
+            <a:stretch/>
+          </p:blipFill>
+          <p:spPr>
+            <a:xfrm rot="20478371">
+              <a:off x="7224038" y="3242950"/>
+              <a:ext cx="45719" cy="55879"/>
+            </a:xfrm>
+            <a:prstGeom prst="rect">
+              <a:avLst/>
+            </a:prstGeom>
+          </p:spPr>
+        </p:pic>
+        <p:pic>
+          <p:nvPicPr>
+            <p:cNvPr id="47" name="Immagine 46" descr="Immagine che contiene vestiti, erba, aria aperta, cielo&#10;&#10;Descrizione generata automaticamente">
+              <a:extLst>
+                <a:ext uri="{FF2B5EF4-FFF2-40B4-BE49-F238E27FC236}">
+                  <a16:creationId xmlns:a16="http://schemas.microsoft.com/office/drawing/2014/main" id="{E14D09A6-C524-27ED-15D9-6FA1743AE341}"/>
+                </a:ext>
+              </a:extLst>
+            </p:cNvPr>
+            <p:cNvPicPr>
+              <a:picLocks noChangeAspect="1"/>
+            </p:cNvPicPr>
+            <p:nvPr/>
+          </p:nvPicPr>
+          <p:blipFill>
+            <a:blip r:embed="rId2">
+              <a:extLst>
+                <a:ext uri="{28A0092B-C50C-407E-A947-70E740481C1C}">
+                  <a14:useLocalDpi xmlns:a14="http://schemas.microsoft.com/office/drawing/2010/main" val="0"/>
+                </a:ext>
+              </a:extLst>
+            </a:blip>
+            <a:srcRect l="56389" t="57283" r="41111" b="38643"/>
+            <a:stretch/>
+          </p:blipFill>
+          <p:spPr>
+            <a:xfrm rot="169141">
+              <a:off x="7242449" y="3282092"/>
+              <a:ext cx="45719" cy="55879"/>
+            </a:xfrm>
+            <a:prstGeom prst="rect">
+              <a:avLst/>
+            </a:prstGeom>
+          </p:spPr>
+        </p:pic>
+        <p:pic>
+          <p:nvPicPr>
+            <p:cNvPr id="48" name="Immagine 47" descr="Immagine che contiene vestiti, erba, aria aperta, cielo&#10;&#10;Descrizione generata automaticamente">
+              <a:extLst>
+                <a:ext uri="{FF2B5EF4-FFF2-40B4-BE49-F238E27FC236}">
+                  <a16:creationId xmlns:a16="http://schemas.microsoft.com/office/drawing/2014/main" id="{937F730F-A3D7-72DD-CBF6-D5DAD7FC6206}"/>
+                </a:ext>
+              </a:extLst>
+            </p:cNvPr>
+            <p:cNvPicPr>
+              <a:picLocks noChangeAspect="1"/>
+            </p:cNvPicPr>
+            <p:nvPr/>
+          </p:nvPicPr>
+          <p:blipFill>
+            <a:blip r:embed="rId2">
+              <a:extLst>
+                <a:ext uri="{28A0092B-C50C-407E-A947-70E740481C1C}">
+                  <a14:useLocalDpi xmlns:a14="http://schemas.microsoft.com/office/drawing/2010/main" val="0"/>
+                </a:ext>
+              </a:extLst>
+            </a:blip>
+            <a:srcRect l="56389" t="57283" r="41111" b="38643"/>
+            <a:stretch/>
+          </p:blipFill>
+          <p:spPr>
+            <a:xfrm rot="169141">
+              <a:off x="7254646" y="3320647"/>
+              <a:ext cx="45719" cy="55879"/>
+            </a:xfrm>
+            <a:prstGeom prst="rect">
+              <a:avLst/>
+            </a:prstGeom>
+          </p:spPr>
+        </p:pic>
+        <p:pic>
+          <p:nvPicPr>
+            <p:cNvPr id="49" name="Immagine 48" descr="Immagine che contiene vestiti, erba, aria aperta, cielo&#10;&#10;Descrizione generata automaticamente">
+              <a:extLst>
+                <a:ext uri="{FF2B5EF4-FFF2-40B4-BE49-F238E27FC236}">
+                  <a16:creationId xmlns:a16="http://schemas.microsoft.com/office/drawing/2014/main" id="{223FF9AF-4E02-85E0-531C-DBF539EAF9E1}"/>
+                </a:ext>
+              </a:extLst>
+            </p:cNvPr>
+            <p:cNvPicPr>
+              <a:picLocks noChangeAspect="1"/>
+            </p:cNvPicPr>
+            <p:nvPr/>
+          </p:nvPicPr>
+          <p:blipFill>
+            <a:blip r:embed="rId2">
+              <a:extLst>
+                <a:ext uri="{28A0092B-C50C-407E-A947-70E740481C1C}">
+                  <a14:useLocalDpi xmlns:a14="http://schemas.microsoft.com/office/drawing/2010/main" val="0"/>
+                </a:ext>
+              </a:extLst>
+            </a:blip>
+            <a:srcRect l="56389" t="57283" r="41111" b="38643"/>
+            <a:stretch/>
+          </p:blipFill>
+          <p:spPr>
+            <a:xfrm rot="169141">
+              <a:off x="7254647" y="3364552"/>
+              <a:ext cx="45719" cy="55879"/>
+            </a:xfrm>
+            <a:prstGeom prst="rect">
+              <a:avLst/>
+            </a:prstGeom>
+          </p:spPr>
+        </p:pic>
+        <p:pic>
+          <p:nvPicPr>
+            <p:cNvPr id="50" name="Immagine 49" descr="Immagine che contiene vestiti, erba, aria aperta, cielo&#10;&#10;Descrizione generata automaticamente">
+              <a:extLst>
+                <a:ext uri="{FF2B5EF4-FFF2-40B4-BE49-F238E27FC236}">
+                  <a16:creationId xmlns:a16="http://schemas.microsoft.com/office/drawing/2014/main" id="{785D91C4-D79A-8D05-6375-F8808EAA6EE9}"/>
+                </a:ext>
+              </a:extLst>
+            </p:cNvPr>
+            <p:cNvPicPr>
+              <a:picLocks noChangeAspect="1"/>
+            </p:cNvPicPr>
+            <p:nvPr/>
+          </p:nvPicPr>
+          <p:blipFill>
+            <a:blip r:embed="rId2">
+              <a:extLst>
+                <a:ext uri="{28A0092B-C50C-407E-A947-70E740481C1C}">
+                  <a14:useLocalDpi xmlns:a14="http://schemas.microsoft.com/office/drawing/2010/main" val="0"/>
+                </a:ext>
+              </a:extLst>
+            </a:blip>
+            <a:srcRect l="56389" t="57283" r="41111" b="38643"/>
+            <a:stretch/>
+          </p:blipFill>
+          <p:spPr>
+            <a:xfrm rot="16557820">
+              <a:off x="7045351" y="3108347"/>
+              <a:ext cx="45719" cy="55879"/>
+            </a:xfrm>
+            <a:prstGeom prst="rect">
+              <a:avLst/>
+            </a:prstGeom>
+          </p:spPr>
+        </p:pic>
+        <p:pic>
+          <p:nvPicPr>
+            <p:cNvPr id="51" name="Immagine 50" descr="Immagine che contiene vestiti, erba, aria aperta, cielo&#10;&#10;Descrizione generata automaticamente">
+              <a:extLst>
+                <a:ext uri="{FF2B5EF4-FFF2-40B4-BE49-F238E27FC236}">
+                  <a16:creationId xmlns:a16="http://schemas.microsoft.com/office/drawing/2014/main" id="{7D33A4B7-0190-246F-0B88-ADD3EA8BED5F}"/>
+                </a:ext>
+              </a:extLst>
+            </p:cNvPr>
+            <p:cNvPicPr>
+              <a:picLocks noChangeAspect="1"/>
+            </p:cNvPicPr>
+            <p:nvPr/>
+          </p:nvPicPr>
+          <p:blipFill>
+            <a:blip r:embed="rId2">
+              <a:extLst>
+                <a:ext uri="{28A0092B-C50C-407E-A947-70E740481C1C}">
+                  <a14:useLocalDpi xmlns:a14="http://schemas.microsoft.com/office/drawing/2010/main" val="0"/>
+                </a:ext>
+              </a:extLst>
+            </a:blip>
+            <a:srcRect l="56389" t="57283" r="41111" b="38643"/>
+            <a:stretch/>
+          </p:blipFill>
+          <p:spPr>
+            <a:xfrm rot="16557820">
+              <a:off x="7000303" y="3082708"/>
+              <a:ext cx="45719" cy="55879"/>
+            </a:xfrm>
+            <a:prstGeom prst="rect">
+              <a:avLst/>
+            </a:prstGeom>
+          </p:spPr>
+        </p:pic>
+        <p:pic>
+          <p:nvPicPr>
+            <p:cNvPr id="52" name="Immagine 51" descr="Immagine che contiene vestiti, erba, aria aperta, cielo&#10;&#10;Descrizione generata automaticamente">
+              <a:extLst>
+                <a:ext uri="{FF2B5EF4-FFF2-40B4-BE49-F238E27FC236}">
+                  <a16:creationId xmlns:a16="http://schemas.microsoft.com/office/drawing/2014/main" id="{37E4B4B7-AE0B-ECC0-33F1-79510AEED1A0}"/>
+                </a:ext>
+              </a:extLst>
+            </p:cNvPr>
+            <p:cNvPicPr>
+              <a:picLocks noChangeAspect="1"/>
+            </p:cNvPicPr>
+            <p:nvPr/>
+          </p:nvPicPr>
+          <p:blipFill>
+            <a:blip r:embed="rId2">
+              <a:extLst>
+                <a:ext uri="{28A0092B-C50C-407E-A947-70E740481C1C}">
+                  <a14:useLocalDpi xmlns:a14="http://schemas.microsoft.com/office/drawing/2010/main" val="0"/>
+                </a:ext>
+              </a:extLst>
+            </a:blip>
+            <a:srcRect l="56389" t="57283" r="41111" b="38643"/>
+            <a:stretch/>
+          </p:blipFill>
+          <p:spPr>
+            <a:xfrm rot="16200000">
+              <a:off x="6978195" y="3099676"/>
+              <a:ext cx="45719" cy="55879"/>
+            </a:xfrm>
+            <a:prstGeom prst="rect">
+              <a:avLst/>
+            </a:prstGeom>
+          </p:spPr>
+        </p:pic>
+        <p:pic>
+          <p:nvPicPr>
+            <p:cNvPr id="53" name="Immagine 52" descr="Immagine che contiene vestiti, erba, aria aperta, cielo&#10;&#10;Descrizione generata automaticamente">
+              <a:extLst>
+                <a:ext uri="{FF2B5EF4-FFF2-40B4-BE49-F238E27FC236}">
+                  <a16:creationId xmlns:a16="http://schemas.microsoft.com/office/drawing/2014/main" id="{85140866-9A1D-1D5F-BEC9-9F4186069642}"/>
+                </a:ext>
+              </a:extLst>
+            </p:cNvPr>
+            <p:cNvPicPr>
+              <a:picLocks noChangeAspect="1"/>
+            </p:cNvPicPr>
+            <p:nvPr/>
+          </p:nvPicPr>
+          <p:blipFill>
+            <a:blip r:embed="rId2">
+              <a:extLst>
+                <a:ext uri="{28A0092B-C50C-407E-A947-70E740481C1C}">
+                  <a14:useLocalDpi xmlns:a14="http://schemas.microsoft.com/office/drawing/2010/main" val="0"/>
+                </a:ext>
+              </a:extLst>
+            </a:blip>
+            <a:srcRect l="56389" t="57283" r="41111" b="38643"/>
+            <a:stretch/>
+          </p:blipFill>
+          <p:spPr>
+            <a:xfrm rot="15025330">
+              <a:off x="6925149" y="3099675"/>
+              <a:ext cx="45719" cy="55879"/>
+            </a:xfrm>
+            <a:prstGeom prst="rect">
+              <a:avLst/>
+            </a:prstGeom>
+          </p:spPr>
+        </p:pic>
+        <p:pic>
+          <p:nvPicPr>
+            <p:cNvPr id="54" name="Immagine 53" descr="Immagine che contiene vestiti, erba, aria aperta, cielo&#10;&#10;Descrizione generata automaticamente">
+              <a:extLst>
+                <a:ext uri="{FF2B5EF4-FFF2-40B4-BE49-F238E27FC236}">
+                  <a16:creationId xmlns:a16="http://schemas.microsoft.com/office/drawing/2014/main" id="{5DC9B195-3B21-94AA-4585-C1022524B773}"/>
+                </a:ext>
+              </a:extLst>
+            </p:cNvPr>
+            <p:cNvPicPr>
+              <a:picLocks noChangeAspect="1"/>
+            </p:cNvPicPr>
+            <p:nvPr/>
+          </p:nvPicPr>
+          <p:blipFill>
+            <a:blip r:embed="rId2">
+              <a:extLst>
+                <a:ext uri="{28A0092B-C50C-407E-A947-70E740481C1C}">
+                  <a14:useLocalDpi xmlns:a14="http://schemas.microsoft.com/office/drawing/2010/main" val="0"/>
+                </a:ext>
+              </a:extLst>
+            </a:blip>
+            <a:srcRect l="56389" t="57283" r="41111" b="38643"/>
+            <a:stretch/>
+          </p:blipFill>
+          <p:spPr>
+            <a:xfrm rot="13921529">
+              <a:off x="6846022" y="3135864"/>
+              <a:ext cx="45719" cy="55879"/>
+            </a:xfrm>
+            <a:prstGeom prst="rect">
+              <a:avLst/>
+            </a:prstGeom>
+          </p:spPr>
+        </p:pic>
+        <p:pic>
+          <p:nvPicPr>
+            <p:cNvPr id="55" name="Immagine 54" descr="Immagine che contiene vestiti, erba, aria aperta, cielo&#10;&#10;Descrizione generata automaticamente">
+              <a:extLst>
+                <a:ext uri="{FF2B5EF4-FFF2-40B4-BE49-F238E27FC236}">
+                  <a16:creationId xmlns:a16="http://schemas.microsoft.com/office/drawing/2014/main" id="{D10183AD-8A93-E26A-96FD-903C3277DDA2}"/>
+                </a:ext>
+              </a:extLst>
+            </p:cNvPr>
+            <p:cNvPicPr>
+              <a:picLocks noChangeAspect="1"/>
+            </p:cNvPicPr>
+            <p:nvPr/>
+          </p:nvPicPr>
+          <p:blipFill>
+            <a:blip r:embed="rId2">
+              <a:extLst>
+                <a:ext uri="{28A0092B-C50C-407E-A947-70E740481C1C}">
+                  <a14:useLocalDpi xmlns:a14="http://schemas.microsoft.com/office/drawing/2010/main" val="0"/>
+                </a:ext>
+              </a:extLst>
+            </a:blip>
+            <a:srcRect l="56389" t="57283" r="41111" b="38643"/>
+            <a:stretch/>
+          </p:blipFill>
+          <p:spPr>
+            <a:xfrm rot="12746859">
+              <a:off x="6880379" y="3128669"/>
+              <a:ext cx="45719" cy="55879"/>
+            </a:xfrm>
+            <a:prstGeom prst="rect">
+              <a:avLst/>
+            </a:prstGeom>
+          </p:spPr>
+        </p:pic>
+        <p:pic>
+          <p:nvPicPr>
+            <p:cNvPr id="56" name="Immagine 55" descr="Immagine che contiene vestiti, erba, aria aperta, cielo&#10;&#10;Descrizione generata automaticamente">
+              <a:extLst>
+                <a:ext uri="{FF2B5EF4-FFF2-40B4-BE49-F238E27FC236}">
+                  <a16:creationId xmlns:a16="http://schemas.microsoft.com/office/drawing/2014/main" id="{E3224949-32F8-58E8-5C1C-C162EAE8020A}"/>
+                </a:ext>
+              </a:extLst>
+            </p:cNvPr>
+            <p:cNvPicPr>
+              <a:picLocks noChangeAspect="1"/>
+            </p:cNvPicPr>
+            <p:nvPr/>
+          </p:nvPicPr>
+          <p:blipFill>
+            <a:blip r:embed="rId2">
+              <a:extLst>
+                <a:ext uri="{28A0092B-C50C-407E-A947-70E740481C1C}">
+                  <a14:useLocalDpi xmlns:a14="http://schemas.microsoft.com/office/drawing/2010/main" val="0"/>
+                </a:ext>
+              </a:extLst>
+            </a:blip>
+            <a:srcRect l="56389" t="57283" r="41111" b="38643"/>
+            <a:stretch/>
+          </p:blipFill>
+          <p:spPr>
+            <a:xfrm rot="13921529">
+              <a:off x="6849571" y="3152589"/>
+              <a:ext cx="45719" cy="55879"/>
+            </a:xfrm>
+            <a:prstGeom prst="rect">
+              <a:avLst/>
+            </a:prstGeom>
+          </p:spPr>
+        </p:pic>
+        <p:pic>
+          <p:nvPicPr>
+            <p:cNvPr id="57" name="Immagine 56" descr="Immagine che contiene vestiti, erba, aria aperta, cielo&#10;&#10;Descrizione generata automaticamente">
+              <a:extLst>
+                <a:ext uri="{FF2B5EF4-FFF2-40B4-BE49-F238E27FC236}">
+                  <a16:creationId xmlns:a16="http://schemas.microsoft.com/office/drawing/2014/main" id="{884E1147-3767-CA19-204C-4AAECE4943D0}"/>
+                </a:ext>
+              </a:extLst>
+            </p:cNvPr>
+            <p:cNvPicPr>
+              <a:picLocks noChangeAspect="1"/>
+            </p:cNvPicPr>
+            <p:nvPr/>
+          </p:nvPicPr>
+          <p:blipFill>
+            <a:blip r:embed="rId2">
+              <a:extLst>
+                <a:ext uri="{28A0092B-C50C-407E-A947-70E740481C1C}">
+                  <a14:useLocalDpi xmlns:a14="http://schemas.microsoft.com/office/drawing/2010/main" val="0"/>
+                </a:ext>
+              </a:extLst>
+            </a:blip>
+            <a:srcRect l="56389" t="57283" r="41111" b="38643"/>
+            <a:stretch/>
+          </p:blipFill>
+          <p:spPr>
+            <a:xfrm rot="12261021">
+              <a:off x="6807984" y="3169646"/>
+              <a:ext cx="45719" cy="55879"/>
+            </a:xfrm>
+            <a:prstGeom prst="rect">
+              <a:avLst/>
+            </a:prstGeom>
+          </p:spPr>
+        </p:pic>
+        <p:pic>
+          <p:nvPicPr>
+            <p:cNvPr id="58" name="Immagine 57" descr="Immagine che contiene vestiti, erba, aria aperta, cielo&#10;&#10;Descrizione generata automaticamente">
+              <a:extLst>
+                <a:ext uri="{FF2B5EF4-FFF2-40B4-BE49-F238E27FC236}">
+                  <a16:creationId xmlns:a16="http://schemas.microsoft.com/office/drawing/2014/main" id="{970F28DA-EEEE-B2A5-278A-BC1B3A3B599A}"/>
+                </a:ext>
+              </a:extLst>
+            </p:cNvPr>
+            <p:cNvPicPr>
+              <a:picLocks noChangeAspect="1"/>
+            </p:cNvPicPr>
+            <p:nvPr/>
+          </p:nvPicPr>
+          <p:blipFill>
+            <a:blip r:embed="rId2">
+              <a:extLst>
+                <a:ext uri="{28A0092B-C50C-407E-A947-70E740481C1C}">
+                  <a14:useLocalDpi xmlns:a14="http://schemas.microsoft.com/office/drawing/2010/main" val="0"/>
+                </a:ext>
+              </a:extLst>
+            </a:blip>
+            <a:srcRect l="56389" t="57283" r="41111" b="38643"/>
+            <a:stretch/>
+          </p:blipFill>
+          <p:spPr>
+            <a:xfrm rot="12261021">
+              <a:off x="6743291" y="3398978"/>
+              <a:ext cx="45719" cy="55879"/>
+            </a:xfrm>
+            <a:prstGeom prst="rect">
+              <a:avLst/>
+            </a:prstGeom>
+          </p:spPr>
+        </p:pic>
+        <p:pic>
+          <p:nvPicPr>
+            <p:cNvPr id="59" name="Immagine 58" descr="Immagine che contiene vestiti, erba, aria aperta, cielo&#10;&#10;Descrizione generata automaticamente">
+              <a:extLst>
+                <a:ext uri="{FF2B5EF4-FFF2-40B4-BE49-F238E27FC236}">
+                  <a16:creationId xmlns:a16="http://schemas.microsoft.com/office/drawing/2014/main" id="{A69373C9-6586-7EB1-79A4-D783264D9821}"/>
+                </a:ext>
+              </a:extLst>
+            </p:cNvPr>
+            <p:cNvPicPr>
+              <a:picLocks noChangeAspect="1"/>
+            </p:cNvPicPr>
+            <p:nvPr/>
+          </p:nvPicPr>
+          <p:blipFill>
+            <a:blip r:embed="rId2">
+              <a:extLst>
+                <a:ext uri="{28A0092B-C50C-407E-A947-70E740481C1C}">
+                  <a14:useLocalDpi xmlns:a14="http://schemas.microsoft.com/office/drawing/2010/main" val="0"/>
+                </a:ext>
+              </a:extLst>
+            </a:blip>
+            <a:srcRect l="56389" t="57283" r="41111" b="38643"/>
+            <a:stretch/>
+          </p:blipFill>
+          <p:spPr>
+            <a:xfrm rot="12261021">
+              <a:off x="6731092" y="3349334"/>
+              <a:ext cx="45719" cy="55879"/>
+            </a:xfrm>
+            <a:prstGeom prst="rect">
+              <a:avLst/>
+            </a:prstGeom>
+          </p:spPr>
+        </p:pic>
+        <p:pic>
+          <p:nvPicPr>
+            <p:cNvPr id="60" name="Immagine 59" descr="Immagine che contiene vestiti, erba, aria aperta, cielo&#10;&#10;Descrizione generata automaticamente">
+              <a:extLst>
+                <a:ext uri="{FF2B5EF4-FFF2-40B4-BE49-F238E27FC236}">
+                  <a16:creationId xmlns:a16="http://schemas.microsoft.com/office/drawing/2014/main" id="{8DAAAADD-60F3-E9A2-AA8D-8E128B09E4D5}"/>
+                </a:ext>
+              </a:extLst>
+            </p:cNvPr>
+            <p:cNvPicPr>
+              <a:picLocks noChangeAspect="1"/>
+            </p:cNvPicPr>
+            <p:nvPr/>
+          </p:nvPicPr>
+          <p:blipFill>
+            <a:blip r:embed="rId2">
+              <a:extLst>
+                <a:ext uri="{28A0092B-C50C-407E-A947-70E740481C1C}">
+                  <a14:useLocalDpi xmlns:a14="http://schemas.microsoft.com/office/drawing/2010/main" val="0"/>
+                </a:ext>
+              </a:extLst>
+            </a:blip>
+            <a:srcRect l="56389" t="57283" r="41111" b="38643"/>
+            <a:stretch/>
+          </p:blipFill>
+          <p:spPr>
+            <a:xfrm rot="11010605">
+              <a:off x="6751111" y="3362445"/>
+              <a:ext cx="45719" cy="55879"/>
+            </a:xfrm>
+            <a:prstGeom prst="rect">
+              <a:avLst/>
+            </a:prstGeom>
+          </p:spPr>
+        </p:pic>
+        <p:pic>
+          <p:nvPicPr>
+            <p:cNvPr id="61" name="Immagine 60" descr="Immagine che contiene vestiti, erba, aria aperta, cielo&#10;&#10;Descrizione generata automaticamente">
+              <a:extLst>
+                <a:ext uri="{FF2B5EF4-FFF2-40B4-BE49-F238E27FC236}">
+                  <a16:creationId xmlns:a16="http://schemas.microsoft.com/office/drawing/2014/main" id="{8D58142B-B92D-DC73-87EB-1B65D00299CC}"/>
+                </a:ext>
+              </a:extLst>
+            </p:cNvPr>
+            <p:cNvPicPr>
+              <a:picLocks noChangeAspect="1"/>
+            </p:cNvPicPr>
+            <p:nvPr/>
+          </p:nvPicPr>
+          <p:blipFill>
+            <a:blip r:embed="rId2">
+              <a:extLst>
+                <a:ext uri="{28A0092B-C50C-407E-A947-70E740481C1C}">
+                  <a14:useLocalDpi xmlns:a14="http://schemas.microsoft.com/office/drawing/2010/main" val="0"/>
+                </a:ext>
+              </a:extLst>
+            </a:blip>
+            <a:srcRect l="56389" t="57283" r="41111" b="38643"/>
+            <a:stretch/>
+          </p:blipFill>
+          <p:spPr>
+            <a:xfrm rot="12233433">
+              <a:off x="6743161" y="3302637"/>
+              <a:ext cx="45719" cy="55879"/>
+            </a:xfrm>
+            <a:prstGeom prst="rect">
+              <a:avLst/>
+            </a:prstGeom>
+          </p:spPr>
+        </p:pic>
+        <p:pic>
+          <p:nvPicPr>
+            <p:cNvPr id="62" name="Immagine 61" descr="Immagine che contiene vestiti, erba, aria aperta, cielo&#10;&#10;Descrizione generata automaticamente">
+              <a:extLst>
+                <a:ext uri="{FF2B5EF4-FFF2-40B4-BE49-F238E27FC236}">
+                  <a16:creationId xmlns:a16="http://schemas.microsoft.com/office/drawing/2014/main" id="{36CC86B5-02A8-719F-06BA-A65487B5448E}"/>
+                </a:ext>
+              </a:extLst>
+            </p:cNvPr>
+            <p:cNvPicPr>
+              <a:picLocks noChangeAspect="1"/>
+            </p:cNvPicPr>
+            <p:nvPr/>
+          </p:nvPicPr>
+          <p:blipFill>
+            <a:blip r:embed="rId2">
+              <a:extLst>
+                <a:ext uri="{28A0092B-C50C-407E-A947-70E740481C1C}">
+                  <a14:useLocalDpi xmlns:a14="http://schemas.microsoft.com/office/drawing/2010/main" val="0"/>
+                </a:ext>
+              </a:extLst>
+            </a:blip>
+            <a:srcRect l="56389" t="57283" r="41111" b="38643"/>
+            <a:stretch/>
+          </p:blipFill>
+          <p:spPr>
+            <a:xfrm rot="12233433">
+              <a:off x="6742901" y="3259188"/>
+              <a:ext cx="45719" cy="55879"/>
+            </a:xfrm>
+            <a:prstGeom prst="rect">
+              <a:avLst/>
+            </a:prstGeom>
+          </p:spPr>
+        </p:pic>
+        <p:pic>
+          <p:nvPicPr>
+            <p:cNvPr id="63" name="Immagine 62" descr="Immagine che contiene vestiti, erba, aria aperta, cielo&#10;&#10;Descrizione generata automaticamente">
+              <a:extLst>
+                <a:ext uri="{FF2B5EF4-FFF2-40B4-BE49-F238E27FC236}">
+                  <a16:creationId xmlns:a16="http://schemas.microsoft.com/office/drawing/2014/main" id="{6EED5A92-7344-1B17-B254-F8FF250CEBC4}"/>
+                </a:ext>
+              </a:extLst>
+            </p:cNvPr>
+            <p:cNvPicPr>
+              <a:picLocks noChangeAspect="1"/>
+            </p:cNvPicPr>
+            <p:nvPr/>
+          </p:nvPicPr>
+          <p:blipFill>
+            <a:blip r:embed="rId2">
+              <a:extLst>
+                <a:ext uri="{28A0092B-C50C-407E-A947-70E740481C1C}">
+                  <a14:useLocalDpi xmlns:a14="http://schemas.microsoft.com/office/drawing/2010/main" val="0"/>
+                </a:ext>
+              </a:extLst>
+            </a:blip>
+            <a:srcRect l="56389" t="57283" r="41111" b="38643"/>
+            <a:stretch/>
+          </p:blipFill>
+          <p:spPr>
+            <a:xfrm rot="12233433">
+              <a:off x="6765237" y="3221537"/>
+              <a:ext cx="45719" cy="55879"/>
+            </a:xfrm>
+            <a:prstGeom prst="rect">
+              <a:avLst/>
+            </a:prstGeom>
+          </p:spPr>
+        </p:pic>
+        <p:pic>
+          <p:nvPicPr>
+            <p:cNvPr id="1024" name="Immagine 1023" descr="Immagine che contiene vestiti, erba, aria aperta, cielo&#10;&#10;Descrizione generata automaticamente">
+              <a:extLst>
+                <a:ext uri="{FF2B5EF4-FFF2-40B4-BE49-F238E27FC236}">
+                  <a16:creationId xmlns:a16="http://schemas.microsoft.com/office/drawing/2014/main" id="{028226A6-6238-2B17-8856-EACDEAE54B17}"/>
+                </a:ext>
+              </a:extLst>
+            </p:cNvPr>
+            <p:cNvPicPr>
+              <a:picLocks noChangeAspect="1"/>
+            </p:cNvPicPr>
+            <p:nvPr/>
+          </p:nvPicPr>
+          <p:blipFill>
+            <a:blip r:embed="rId2">
+              <a:extLst>
+                <a:ext uri="{28A0092B-C50C-407E-A947-70E740481C1C}">
+                  <a14:useLocalDpi xmlns:a14="http://schemas.microsoft.com/office/drawing/2010/main" val="0"/>
+                </a:ext>
+              </a:extLst>
+            </a:blip>
+            <a:srcRect l="56389" t="57283" r="41111" b="38643"/>
+            <a:stretch/>
+          </p:blipFill>
+          <p:spPr>
+            <a:xfrm rot="13183319">
+              <a:off x="6784252" y="3201558"/>
+              <a:ext cx="45719" cy="55879"/>
+            </a:xfrm>
+            <a:prstGeom prst="rect">
+              <a:avLst/>
+            </a:prstGeom>
+          </p:spPr>
+        </p:pic>
+        <p:pic>
+          <p:nvPicPr>
+            <p:cNvPr id="1025" name="Immagine 1024" descr="Immagine che contiene vestiti, erba, aria aperta, cielo&#10;&#10;Descrizione generata automaticamente">
+              <a:extLst>
+                <a:ext uri="{FF2B5EF4-FFF2-40B4-BE49-F238E27FC236}">
+                  <a16:creationId xmlns:a16="http://schemas.microsoft.com/office/drawing/2014/main" id="{E61EF769-75C4-F234-005A-E1F8BBA3F1EF}"/>
+                </a:ext>
+              </a:extLst>
+            </p:cNvPr>
+            <p:cNvPicPr>
+              <a:picLocks noChangeAspect="1"/>
+            </p:cNvPicPr>
+            <p:nvPr/>
+          </p:nvPicPr>
+          <p:blipFill>
+            <a:blip r:embed="rId2">
+              <a:extLst>
+                <a:ext uri="{28A0092B-C50C-407E-A947-70E740481C1C}">
+                  <a14:useLocalDpi xmlns:a14="http://schemas.microsoft.com/office/drawing/2010/main" val="0"/>
+                </a:ext>
+              </a:extLst>
+            </a:blip>
+            <a:srcRect l="56389" t="57283" r="41111" b="38643"/>
+            <a:stretch/>
+          </p:blipFill>
+          <p:spPr>
+            <a:xfrm rot="12233433">
+              <a:off x="6766603" y="3311123"/>
+              <a:ext cx="45719" cy="55879"/>
+            </a:xfrm>
+            <a:prstGeom prst="rect">
+              <a:avLst/>
+            </a:prstGeom>
+          </p:spPr>
+        </p:pic>
+        <p:pic>
+          <p:nvPicPr>
+            <p:cNvPr id="1027" name="Immagine 1026" descr="Immagine che contiene vestiti, erba, aria aperta, cielo&#10;&#10;Descrizione generata automaticamente">
+              <a:extLst>
+                <a:ext uri="{FF2B5EF4-FFF2-40B4-BE49-F238E27FC236}">
+                  <a16:creationId xmlns:a16="http://schemas.microsoft.com/office/drawing/2014/main" id="{60EA0F4D-58A2-9A48-CDE0-07A36A7F2509}"/>
+                </a:ext>
+              </a:extLst>
+            </p:cNvPr>
+            <p:cNvPicPr>
+              <a:picLocks noChangeAspect="1"/>
+            </p:cNvPicPr>
+            <p:nvPr/>
+          </p:nvPicPr>
+          <p:blipFill>
+            <a:blip r:embed="rId2">
+              <a:extLst>
+                <a:ext uri="{28A0092B-C50C-407E-A947-70E740481C1C}">
+                  <a14:useLocalDpi xmlns:a14="http://schemas.microsoft.com/office/drawing/2010/main" val="0"/>
+                </a:ext>
+              </a:extLst>
+            </a:blip>
+            <a:srcRect l="56389" t="57283" r="41111" b="38643"/>
+            <a:stretch/>
+          </p:blipFill>
+          <p:spPr>
+            <a:xfrm rot="12233433">
+              <a:off x="6766343" y="3267674"/>
+              <a:ext cx="45719" cy="55879"/>
+            </a:xfrm>
+            <a:prstGeom prst="rect">
+              <a:avLst/>
+            </a:prstGeom>
+          </p:spPr>
+        </p:pic>
+        <p:pic>
+          <p:nvPicPr>
+            <p:cNvPr id="1028" name="Immagine 1027" descr="Immagine che contiene vestiti, erba, aria aperta, cielo&#10;&#10;Descrizione generata automaticamente">
+              <a:extLst>
+                <a:ext uri="{FF2B5EF4-FFF2-40B4-BE49-F238E27FC236}">
+                  <a16:creationId xmlns:a16="http://schemas.microsoft.com/office/drawing/2014/main" id="{844D7197-B273-FE9F-4A8F-D2DAF9C13B8C}"/>
+                </a:ext>
+              </a:extLst>
+            </p:cNvPr>
+            <p:cNvPicPr>
+              <a:picLocks noChangeAspect="1"/>
+            </p:cNvPicPr>
+            <p:nvPr/>
+          </p:nvPicPr>
+          <p:blipFill>
+            <a:blip r:embed="rId2">
+              <a:extLst>
+                <a:ext uri="{28A0092B-C50C-407E-A947-70E740481C1C}">
+                  <a14:useLocalDpi xmlns:a14="http://schemas.microsoft.com/office/drawing/2010/main" val="0"/>
+                </a:ext>
+              </a:extLst>
+            </a:blip>
+            <a:srcRect l="56389" t="57283" r="41111" b="38643"/>
+            <a:stretch/>
+          </p:blipFill>
+          <p:spPr>
+            <a:xfrm rot="13183319">
+              <a:off x="6807694" y="3210044"/>
+              <a:ext cx="45719" cy="55879"/>
+            </a:xfrm>
+            <a:prstGeom prst="rect">
+              <a:avLst/>
+            </a:prstGeom>
+          </p:spPr>
+        </p:pic>
+        <p:pic>
+          <p:nvPicPr>
+            <p:cNvPr id="1029" name="Immagine 1028" descr="Immagine che contiene vestiti, erba, aria aperta, cielo&#10;&#10;Descrizione generata automaticamente">
+              <a:extLst>
+                <a:ext uri="{FF2B5EF4-FFF2-40B4-BE49-F238E27FC236}">
+                  <a16:creationId xmlns:a16="http://schemas.microsoft.com/office/drawing/2014/main" id="{C05069B0-534B-677C-0B38-F54C5723DC13}"/>
+                </a:ext>
+              </a:extLst>
+            </p:cNvPr>
+            <p:cNvPicPr>
+              <a:picLocks noChangeAspect="1"/>
+            </p:cNvPicPr>
+            <p:nvPr/>
+          </p:nvPicPr>
+          <p:blipFill>
+            <a:blip r:embed="rId2">
+              <a:extLst>
+                <a:ext uri="{28A0092B-C50C-407E-A947-70E740481C1C}">
+                  <a14:useLocalDpi xmlns:a14="http://schemas.microsoft.com/office/drawing/2010/main" val="0"/>
+                </a:ext>
+              </a:extLst>
+            </a:blip>
+            <a:srcRect l="56389" t="57283" r="41111" b="38643"/>
+            <a:stretch/>
+          </p:blipFill>
+          <p:spPr>
+            <a:xfrm rot="12233433">
+              <a:off x="6799072" y="3279339"/>
+              <a:ext cx="45719" cy="55879"/>
+            </a:xfrm>
+            <a:prstGeom prst="rect">
+              <a:avLst/>
+            </a:prstGeom>
+          </p:spPr>
+        </p:pic>
+        <p:pic>
+          <p:nvPicPr>
+            <p:cNvPr id="1030" name="Immagine 1029" descr="Immagine che contiene vestiti, erba, aria aperta, cielo&#10;&#10;Descrizione generata automaticamente">
+              <a:extLst>
+                <a:ext uri="{FF2B5EF4-FFF2-40B4-BE49-F238E27FC236}">
+                  <a16:creationId xmlns:a16="http://schemas.microsoft.com/office/drawing/2014/main" id="{6265F763-30EA-78AC-3D3B-DCF602113469}"/>
+                </a:ext>
+              </a:extLst>
+            </p:cNvPr>
+            <p:cNvPicPr>
+              <a:picLocks noChangeAspect="1"/>
+            </p:cNvPicPr>
+            <p:nvPr/>
+          </p:nvPicPr>
+          <p:blipFill>
+            <a:blip r:embed="rId2">
+              <a:extLst>
+                <a:ext uri="{28A0092B-C50C-407E-A947-70E740481C1C}">
+                  <a14:useLocalDpi xmlns:a14="http://schemas.microsoft.com/office/drawing/2010/main" val="0"/>
+                </a:ext>
+              </a:extLst>
+            </a:blip>
+            <a:srcRect l="56389" t="57283" r="41111" b="38643"/>
+            <a:stretch/>
+          </p:blipFill>
+          <p:spPr>
+            <a:xfrm rot="12233433">
+              <a:off x="6798812" y="3235890"/>
+              <a:ext cx="45719" cy="55879"/>
+            </a:xfrm>
+            <a:prstGeom prst="rect">
+              <a:avLst/>
+            </a:prstGeom>
+          </p:spPr>
+        </p:pic>
+        <p:pic>
+          <p:nvPicPr>
+            <p:cNvPr id="1031" name="Immagine 1030" descr="Immagine che contiene vestiti, erba, aria aperta, cielo&#10;&#10;Descrizione generata automaticamente">
+              <a:extLst>
+                <a:ext uri="{FF2B5EF4-FFF2-40B4-BE49-F238E27FC236}">
+                  <a16:creationId xmlns:a16="http://schemas.microsoft.com/office/drawing/2014/main" id="{4ADF7329-37D7-AACF-CB17-A7F2ED0209E0}"/>
+                </a:ext>
+              </a:extLst>
+            </p:cNvPr>
+            <p:cNvPicPr>
+              <a:picLocks noChangeAspect="1"/>
+            </p:cNvPicPr>
+            <p:nvPr/>
+          </p:nvPicPr>
+          <p:blipFill>
+            <a:blip r:embed="rId2">
+              <a:extLst>
+                <a:ext uri="{28A0092B-C50C-407E-A947-70E740481C1C}">
+                  <a14:useLocalDpi xmlns:a14="http://schemas.microsoft.com/office/drawing/2010/main" val="0"/>
+                </a:ext>
+              </a:extLst>
+            </a:blip>
+            <a:srcRect l="56389" t="57283" r="41111" b="38643"/>
+            <a:stretch/>
+          </p:blipFill>
+          <p:spPr>
+            <a:xfrm rot="13183319">
+              <a:off x="6840163" y="3178260"/>
+              <a:ext cx="45719" cy="55879"/>
+            </a:xfrm>
+            <a:prstGeom prst="rect">
+              <a:avLst/>
+            </a:prstGeom>
+          </p:spPr>
+        </p:pic>
+        <p:pic>
+          <p:nvPicPr>
+            <p:cNvPr id="1032" name="Immagine 1031" descr="Immagine che contiene vestiti, erba, aria aperta, cielo&#10;&#10;Descrizione generata automaticamente">
+              <a:extLst>
+                <a:ext uri="{FF2B5EF4-FFF2-40B4-BE49-F238E27FC236}">
+                  <a16:creationId xmlns:a16="http://schemas.microsoft.com/office/drawing/2014/main" id="{02CF69E2-B28D-5DBD-2F15-CD76F79F572B}"/>
+                </a:ext>
+              </a:extLst>
+            </p:cNvPr>
+            <p:cNvPicPr>
+              <a:picLocks noChangeAspect="1"/>
+            </p:cNvPicPr>
+            <p:nvPr/>
+          </p:nvPicPr>
+          <p:blipFill>
+            <a:blip r:embed="rId2">
+              <a:extLst>
+                <a:ext uri="{28A0092B-C50C-407E-A947-70E740481C1C}">
+                  <a14:useLocalDpi xmlns:a14="http://schemas.microsoft.com/office/drawing/2010/main" val="0"/>
+                </a:ext>
+              </a:extLst>
+            </a:blip>
+            <a:srcRect l="56389" t="57283" r="41111" b="38643"/>
+            <a:stretch/>
+          </p:blipFill>
+          <p:spPr>
+            <a:xfrm rot="13183319">
+              <a:off x="6827093" y="3212884"/>
+              <a:ext cx="45719" cy="55879"/>
+            </a:xfrm>
+            <a:prstGeom prst="rect">
+              <a:avLst/>
+            </a:prstGeom>
+          </p:spPr>
+        </p:pic>
+        <p:pic>
+          <p:nvPicPr>
+            <p:cNvPr id="1033" name="Immagine 1032" descr="Immagine che contiene vestiti, erba, aria aperta, cielo&#10;&#10;Descrizione generata automaticamente">
+              <a:extLst>
+                <a:ext uri="{FF2B5EF4-FFF2-40B4-BE49-F238E27FC236}">
+                  <a16:creationId xmlns:a16="http://schemas.microsoft.com/office/drawing/2014/main" id="{7937AC56-0394-3383-8428-3A94A90E402A}"/>
+                </a:ext>
+              </a:extLst>
+            </p:cNvPr>
+            <p:cNvPicPr>
+              <a:picLocks noChangeAspect="1"/>
+            </p:cNvPicPr>
+            <p:nvPr/>
+          </p:nvPicPr>
+          <p:blipFill>
+            <a:blip r:embed="rId2">
+              <a:extLst>
+                <a:ext uri="{28A0092B-C50C-407E-A947-70E740481C1C}">
+                  <a14:useLocalDpi xmlns:a14="http://schemas.microsoft.com/office/drawing/2010/main" val="0"/>
+                </a:ext>
+              </a:extLst>
+            </a:blip>
+            <a:srcRect l="56389" t="57283" r="41111" b="38643"/>
+            <a:stretch/>
+          </p:blipFill>
+          <p:spPr>
+            <a:xfrm rot="12233433">
+              <a:off x="6841653" y="3247216"/>
+              <a:ext cx="45719" cy="55879"/>
+            </a:xfrm>
+            <a:prstGeom prst="rect">
+              <a:avLst/>
+            </a:prstGeom>
+          </p:spPr>
+        </p:pic>
+        <p:pic>
+          <p:nvPicPr>
+            <p:cNvPr id="1034" name="Immagine 1033" descr="Immagine che contiene vestiti, erba, aria aperta, cielo&#10;&#10;Descrizione generata automaticamente">
+              <a:extLst>
+                <a:ext uri="{FF2B5EF4-FFF2-40B4-BE49-F238E27FC236}">
+                  <a16:creationId xmlns:a16="http://schemas.microsoft.com/office/drawing/2014/main" id="{33F8B04D-C401-53D6-2B53-4834A2CF34BE}"/>
+                </a:ext>
+              </a:extLst>
+            </p:cNvPr>
+            <p:cNvPicPr>
+              <a:picLocks noChangeAspect="1"/>
+            </p:cNvPicPr>
+            <p:nvPr/>
+          </p:nvPicPr>
+          <p:blipFill>
+            <a:blip r:embed="rId2">
+              <a:extLst>
+                <a:ext uri="{28A0092B-C50C-407E-A947-70E740481C1C}">
+                  <a14:useLocalDpi xmlns:a14="http://schemas.microsoft.com/office/drawing/2010/main" val="0"/>
+                </a:ext>
+              </a:extLst>
+            </a:blip>
+            <a:srcRect l="56389" t="57283" r="41111" b="38643"/>
+            <a:stretch/>
+          </p:blipFill>
+          <p:spPr>
+            <a:xfrm rot="13183319">
+              <a:off x="6883004" y="3189586"/>
+              <a:ext cx="45719" cy="55879"/>
+            </a:xfrm>
+            <a:prstGeom prst="rect">
+              <a:avLst/>
+            </a:prstGeom>
+          </p:spPr>
+        </p:pic>
+        <p:pic>
+          <p:nvPicPr>
+            <p:cNvPr id="1035" name="Immagine 1034" descr="Immagine che contiene vestiti, erba, aria aperta, cielo&#10;&#10;Descrizione generata automaticamente">
+              <a:extLst>
+                <a:ext uri="{FF2B5EF4-FFF2-40B4-BE49-F238E27FC236}">
+                  <a16:creationId xmlns:a16="http://schemas.microsoft.com/office/drawing/2014/main" id="{FACA05CD-31EC-2B26-8537-B7D38F671DBD}"/>
+                </a:ext>
+              </a:extLst>
+            </p:cNvPr>
+            <p:cNvPicPr>
+              <a:picLocks noChangeAspect="1"/>
+            </p:cNvPicPr>
+            <p:nvPr/>
+          </p:nvPicPr>
+          <p:blipFill>
+            <a:blip r:embed="rId2">
+              <a:extLst>
+                <a:ext uri="{28A0092B-C50C-407E-A947-70E740481C1C}">
+                  <a14:useLocalDpi xmlns:a14="http://schemas.microsoft.com/office/drawing/2010/main" val="0"/>
+                </a:ext>
+              </a:extLst>
+            </a:blip>
+            <a:srcRect l="56389" t="57283" r="41111" b="38643"/>
+            <a:stretch/>
+          </p:blipFill>
+          <p:spPr>
+            <a:xfrm rot="15178399">
+              <a:off x="6850866" y="3171091"/>
+              <a:ext cx="45719" cy="55879"/>
+            </a:xfrm>
+            <a:prstGeom prst="rect">
+              <a:avLst/>
+            </a:prstGeom>
+          </p:spPr>
+        </p:pic>
+        <p:pic>
+          <p:nvPicPr>
+            <p:cNvPr id="1036" name="Immagine 1035" descr="Immagine che contiene vestiti, erba, aria aperta, cielo&#10;&#10;Descrizione generata automaticamente">
+              <a:extLst>
+                <a:ext uri="{FF2B5EF4-FFF2-40B4-BE49-F238E27FC236}">
+                  <a16:creationId xmlns:a16="http://schemas.microsoft.com/office/drawing/2014/main" id="{348A9F1B-2680-AD3B-848B-CB86DD212764}"/>
+                </a:ext>
+              </a:extLst>
+            </p:cNvPr>
+            <p:cNvPicPr>
+              <a:picLocks noChangeAspect="1"/>
+            </p:cNvPicPr>
+            <p:nvPr/>
+          </p:nvPicPr>
+          <p:blipFill>
+            <a:blip r:embed="rId2">
+              <a:extLst>
+                <a:ext uri="{28A0092B-C50C-407E-A947-70E740481C1C}">
+                  <a14:useLocalDpi xmlns:a14="http://schemas.microsoft.com/office/drawing/2010/main" val="0"/>
+                </a:ext>
+              </a:extLst>
+            </a:blip>
+            <a:srcRect l="56389" t="57283" r="41111" b="38643"/>
+            <a:stretch/>
+          </p:blipFill>
+          <p:spPr>
+            <a:xfrm rot="14228513">
+              <a:off x="6865426" y="3205423"/>
+              <a:ext cx="45719" cy="55879"/>
+            </a:xfrm>
+            <a:prstGeom prst="rect">
+              <a:avLst/>
+            </a:prstGeom>
+          </p:spPr>
+        </p:pic>
+        <p:pic>
+          <p:nvPicPr>
+            <p:cNvPr id="1037" name="Immagine 1036" descr="Immagine che contiene vestiti, erba, aria aperta, cielo&#10;&#10;Descrizione generata automaticamente">
+              <a:extLst>
+                <a:ext uri="{FF2B5EF4-FFF2-40B4-BE49-F238E27FC236}">
+                  <a16:creationId xmlns:a16="http://schemas.microsoft.com/office/drawing/2014/main" id="{FBB8F677-4F4F-9730-0885-2ADA8F7D6AD9}"/>
+                </a:ext>
+              </a:extLst>
+            </p:cNvPr>
+            <p:cNvPicPr>
+              <a:picLocks noChangeAspect="1"/>
+            </p:cNvPicPr>
+            <p:nvPr/>
+          </p:nvPicPr>
+          <p:blipFill>
+            <a:blip r:embed="rId2">
+              <a:extLst>
+                <a:ext uri="{28A0092B-C50C-407E-A947-70E740481C1C}">
+                  <a14:useLocalDpi xmlns:a14="http://schemas.microsoft.com/office/drawing/2010/main" val="0"/>
+                </a:ext>
+              </a:extLst>
+            </a:blip>
+            <a:srcRect l="56389" t="57283" r="41111" b="38643"/>
+            <a:stretch/>
+          </p:blipFill>
+          <p:spPr>
+            <a:xfrm rot="15178399">
+              <a:off x="6906777" y="3147793"/>
+              <a:ext cx="45719" cy="55879"/>
+            </a:xfrm>
+            <a:prstGeom prst="rect">
+              <a:avLst/>
+            </a:prstGeom>
+          </p:spPr>
+        </p:pic>
+        <p:pic>
+          <p:nvPicPr>
+            <p:cNvPr id="1038" name="Immagine 1037" descr="Immagine che contiene vestiti, erba, aria aperta, cielo&#10;&#10;Descrizione generata automaticamente">
+              <a:extLst>
+                <a:ext uri="{FF2B5EF4-FFF2-40B4-BE49-F238E27FC236}">
+                  <a16:creationId xmlns:a16="http://schemas.microsoft.com/office/drawing/2014/main" id="{D56C4872-98E2-A27E-EF31-3BAB579FCC2A}"/>
+                </a:ext>
+              </a:extLst>
+            </p:cNvPr>
+            <p:cNvPicPr>
+              <a:picLocks noChangeAspect="1"/>
+            </p:cNvPicPr>
+            <p:nvPr/>
+          </p:nvPicPr>
+          <p:blipFill>
+            <a:blip r:embed="rId2">
+              <a:extLst>
+                <a:ext uri="{28A0092B-C50C-407E-A947-70E740481C1C}">
+                  <a14:useLocalDpi xmlns:a14="http://schemas.microsoft.com/office/drawing/2010/main" val="0"/>
+                </a:ext>
+              </a:extLst>
+            </a:blip>
+            <a:srcRect l="56389" t="57283" r="41111" b="38643"/>
+            <a:stretch/>
+          </p:blipFill>
+          <p:spPr>
+            <a:xfrm rot="3930495">
+              <a:off x="6914202" y="3148513"/>
+              <a:ext cx="45719" cy="55879"/>
+            </a:xfrm>
+            <a:prstGeom prst="rect">
+              <a:avLst/>
+            </a:prstGeom>
+          </p:spPr>
+        </p:pic>
+        <p:pic>
+          <p:nvPicPr>
+            <p:cNvPr id="1039" name="Immagine 1038" descr="Immagine che contiene vestiti, erba, aria aperta, cielo&#10;&#10;Descrizione generata automaticamente">
+              <a:extLst>
+                <a:ext uri="{FF2B5EF4-FFF2-40B4-BE49-F238E27FC236}">
+                  <a16:creationId xmlns:a16="http://schemas.microsoft.com/office/drawing/2014/main" id="{ABFDFA7C-AFFC-A0EF-A89D-147D4511B046}"/>
+                </a:ext>
+              </a:extLst>
+            </p:cNvPr>
+            <p:cNvPicPr>
+              <a:picLocks noChangeAspect="1"/>
+            </p:cNvPicPr>
+            <p:nvPr/>
+          </p:nvPicPr>
+          <p:blipFill>
+            <a:blip r:embed="rId2">
+              <a:extLst>
+                <a:ext uri="{28A0092B-C50C-407E-A947-70E740481C1C}">
+                  <a14:useLocalDpi xmlns:a14="http://schemas.microsoft.com/office/drawing/2010/main" val="0"/>
+                </a:ext>
+              </a:extLst>
+            </a:blip>
+            <a:srcRect l="56389" t="57283" r="41111" b="38643"/>
+            <a:stretch/>
+          </p:blipFill>
+          <p:spPr>
+            <a:xfrm rot="2980609">
+              <a:off x="6928762" y="3182845"/>
+              <a:ext cx="45719" cy="55879"/>
+            </a:xfrm>
+            <a:prstGeom prst="rect">
+              <a:avLst/>
+            </a:prstGeom>
+          </p:spPr>
+        </p:pic>
+        <p:pic>
+          <p:nvPicPr>
+            <p:cNvPr id="1040" name="Immagine 1039" descr="Immagine che contiene vestiti, erba, aria aperta, cielo&#10;&#10;Descrizione generata automaticamente">
+              <a:extLst>
+                <a:ext uri="{FF2B5EF4-FFF2-40B4-BE49-F238E27FC236}">
+                  <a16:creationId xmlns:a16="http://schemas.microsoft.com/office/drawing/2014/main" id="{862978B9-21CE-1C98-890E-514B7293CEFE}"/>
+                </a:ext>
+              </a:extLst>
+            </p:cNvPr>
+            <p:cNvPicPr>
+              <a:picLocks noChangeAspect="1"/>
+            </p:cNvPicPr>
+            <p:nvPr/>
+          </p:nvPicPr>
+          <p:blipFill>
+            <a:blip r:embed="rId2">
+              <a:extLst>
+                <a:ext uri="{28A0092B-C50C-407E-A947-70E740481C1C}">
+                  <a14:useLocalDpi xmlns:a14="http://schemas.microsoft.com/office/drawing/2010/main" val="0"/>
+                </a:ext>
+              </a:extLst>
+            </a:blip>
+            <a:srcRect l="56389" t="57283" r="41111" b="38643"/>
+            <a:stretch/>
+          </p:blipFill>
+          <p:spPr>
+            <a:xfrm rot="5925575">
+              <a:off x="6937975" y="3106720"/>
+              <a:ext cx="45719" cy="55879"/>
+            </a:xfrm>
+            <a:prstGeom prst="rect">
+              <a:avLst/>
+            </a:prstGeom>
+          </p:spPr>
+        </p:pic>
+        <p:pic>
+          <p:nvPicPr>
+            <p:cNvPr id="1041" name="Immagine 1040" descr="Immagine che contiene vestiti, erba, aria aperta, cielo&#10;&#10;Descrizione generata automaticamente">
+              <a:extLst>
+                <a:ext uri="{FF2B5EF4-FFF2-40B4-BE49-F238E27FC236}">
+                  <a16:creationId xmlns:a16="http://schemas.microsoft.com/office/drawing/2014/main" id="{28C93247-27FE-5002-A22D-4B525A3AC4AF}"/>
+                </a:ext>
+              </a:extLst>
+            </p:cNvPr>
+            <p:cNvPicPr>
+              <a:picLocks noChangeAspect="1"/>
+            </p:cNvPicPr>
+            <p:nvPr/>
+          </p:nvPicPr>
+          <p:blipFill>
+            <a:blip r:embed="rId2">
+              <a:extLst>
+                <a:ext uri="{28A0092B-C50C-407E-A947-70E740481C1C}">
+                  <a14:useLocalDpi xmlns:a14="http://schemas.microsoft.com/office/drawing/2010/main" val="0"/>
+                </a:ext>
+              </a:extLst>
+            </a:blip>
+            <a:srcRect l="56389" t="57283" r="41111" b="38643"/>
+            <a:stretch/>
+          </p:blipFill>
+          <p:spPr>
+            <a:xfrm rot="4975689">
+              <a:off x="6952535" y="3141052"/>
+              <a:ext cx="45719" cy="55879"/>
+            </a:xfrm>
+            <a:prstGeom prst="rect">
+              <a:avLst/>
+            </a:prstGeom>
+          </p:spPr>
+        </p:pic>
+        <p:pic>
+          <p:nvPicPr>
+            <p:cNvPr id="1042" name="Immagine 1041" descr="Immagine che contiene vestiti, erba, aria aperta, cielo&#10;&#10;Descrizione generata automaticamente">
+              <a:extLst>
+                <a:ext uri="{FF2B5EF4-FFF2-40B4-BE49-F238E27FC236}">
+                  <a16:creationId xmlns:a16="http://schemas.microsoft.com/office/drawing/2014/main" id="{BF9EEAFA-DA96-7301-6285-E4837258EF00}"/>
+                </a:ext>
+              </a:extLst>
+            </p:cNvPr>
+            <p:cNvPicPr>
+              <a:picLocks noChangeAspect="1"/>
+            </p:cNvPicPr>
+            <p:nvPr/>
+          </p:nvPicPr>
+          <p:blipFill>
+            <a:blip r:embed="rId2">
+              <a:extLst>
+                <a:ext uri="{28A0092B-C50C-407E-A947-70E740481C1C}">
+                  <a14:useLocalDpi xmlns:a14="http://schemas.microsoft.com/office/drawing/2010/main" val="0"/>
+                </a:ext>
+              </a:extLst>
+            </a:blip>
+            <a:srcRect l="56389" t="57283" r="41111" b="38643"/>
+            <a:stretch/>
+          </p:blipFill>
+          <p:spPr>
+            <a:xfrm rot="5925575">
+              <a:off x="6993886" y="3083422"/>
+              <a:ext cx="45719" cy="55879"/>
+            </a:xfrm>
+            <a:prstGeom prst="rect">
+              <a:avLst/>
+            </a:prstGeom>
+          </p:spPr>
+        </p:pic>
+        <p:pic>
+          <p:nvPicPr>
+            <p:cNvPr id="1043" name="Immagine 1042" descr="Immagine che contiene vestiti, erba, aria aperta, cielo&#10;&#10;Descrizione generata automaticamente">
+              <a:extLst>
+                <a:ext uri="{FF2B5EF4-FFF2-40B4-BE49-F238E27FC236}">
+                  <a16:creationId xmlns:a16="http://schemas.microsoft.com/office/drawing/2014/main" id="{251EE716-EEAA-D941-1B4B-CE877A6CFC39}"/>
+                </a:ext>
+              </a:extLst>
+            </p:cNvPr>
+            <p:cNvPicPr>
+              <a:picLocks noChangeAspect="1"/>
+            </p:cNvPicPr>
+            <p:nvPr/>
+          </p:nvPicPr>
+          <p:blipFill>
+            <a:blip r:embed="rId2">
+              <a:extLst>
+                <a:ext uri="{28A0092B-C50C-407E-A947-70E740481C1C}">
+                  <a14:useLocalDpi xmlns:a14="http://schemas.microsoft.com/office/drawing/2010/main" val="0"/>
+                </a:ext>
+              </a:extLst>
+            </a:blip>
+            <a:srcRect l="56389" t="57283" r="41111" b="38643"/>
+            <a:stretch/>
+          </p:blipFill>
+          <p:spPr>
+            <a:xfrm rot="18155886">
+              <a:off x="7054086" y="3151775"/>
+              <a:ext cx="45719" cy="55879"/>
+            </a:xfrm>
+            <a:prstGeom prst="rect">
+              <a:avLst/>
+            </a:prstGeom>
+          </p:spPr>
+        </p:pic>
+        <p:pic>
+          <p:nvPicPr>
+            <p:cNvPr id="1044" name="Immagine 1043" descr="Immagine che contiene vestiti, erba, aria aperta, cielo&#10;&#10;Descrizione generata automaticamente">
+              <a:extLst>
+                <a:ext uri="{FF2B5EF4-FFF2-40B4-BE49-F238E27FC236}">
+                  <a16:creationId xmlns:a16="http://schemas.microsoft.com/office/drawing/2014/main" id="{D833598E-2FF7-46A1-5210-B685137C113E}"/>
+                </a:ext>
+              </a:extLst>
+            </p:cNvPr>
+            <p:cNvPicPr>
+              <a:picLocks noChangeAspect="1"/>
+            </p:cNvPicPr>
+            <p:nvPr/>
+          </p:nvPicPr>
+          <p:blipFill>
+            <a:blip r:embed="rId2">
+              <a:extLst>
+                <a:ext uri="{28A0092B-C50C-407E-A947-70E740481C1C}">
+                  <a14:useLocalDpi xmlns:a14="http://schemas.microsoft.com/office/drawing/2010/main" val="0"/>
+                </a:ext>
+              </a:extLst>
+            </a:blip>
+            <a:srcRect l="56389" t="57283" r="41111" b="38643"/>
+            <a:stretch/>
+          </p:blipFill>
+          <p:spPr>
+            <a:xfrm rot="18155886">
+              <a:off x="7089939" y="3172950"/>
+              <a:ext cx="45719" cy="55879"/>
+            </a:xfrm>
+            <a:prstGeom prst="rect">
+              <a:avLst/>
+            </a:prstGeom>
+          </p:spPr>
+        </p:pic>
+        <p:pic>
+          <p:nvPicPr>
+            <p:cNvPr id="1045" name="Immagine 1044" descr="Immagine che contiene vestiti, erba, aria aperta, cielo&#10;&#10;Descrizione generata automaticamente">
+              <a:extLst>
+                <a:ext uri="{FF2B5EF4-FFF2-40B4-BE49-F238E27FC236}">
+                  <a16:creationId xmlns:a16="http://schemas.microsoft.com/office/drawing/2014/main" id="{426E3687-65EB-9D79-F3C6-BD7D42C5E1DD}"/>
+                </a:ext>
+              </a:extLst>
+            </p:cNvPr>
+            <p:cNvPicPr>
+              <a:picLocks noChangeAspect="1"/>
+            </p:cNvPicPr>
+            <p:nvPr/>
+          </p:nvPicPr>
+          <p:blipFill>
+            <a:blip r:embed="rId2">
+              <a:extLst>
+                <a:ext uri="{28A0092B-C50C-407E-A947-70E740481C1C}">
+                  <a14:useLocalDpi xmlns:a14="http://schemas.microsoft.com/office/drawing/2010/main" val="0"/>
+                </a:ext>
+              </a:extLst>
+            </a:blip>
+            <a:srcRect l="56389" t="57283" r="41111" b="38643"/>
+            <a:stretch/>
+          </p:blipFill>
+          <p:spPr>
+            <a:xfrm rot="16557820">
+              <a:off x="7001729" y="3127271"/>
+              <a:ext cx="45719" cy="55879"/>
+            </a:xfrm>
+            <a:prstGeom prst="rect">
+              <a:avLst/>
+            </a:prstGeom>
+          </p:spPr>
+        </p:pic>
+        <p:pic>
+          <p:nvPicPr>
+            <p:cNvPr id="1046" name="Immagine 1045" descr="Immagine che contiene vestiti, erba, aria aperta, cielo&#10;&#10;Descrizione generata automaticamente">
+              <a:extLst>
+                <a:ext uri="{FF2B5EF4-FFF2-40B4-BE49-F238E27FC236}">
+                  <a16:creationId xmlns:a16="http://schemas.microsoft.com/office/drawing/2014/main" id="{641D8E38-219E-D571-BB6E-3995E3E4D0D6}"/>
+                </a:ext>
+              </a:extLst>
+            </p:cNvPr>
+            <p:cNvPicPr>
+              <a:picLocks noChangeAspect="1"/>
+            </p:cNvPicPr>
+            <p:nvPr/>
+          </p:nvPicPr>
+          <p:blipFill>
+            <a:blip r:embed="rId2">
+              <a:extLst>
+                <a:ext uri="{28A0092B-C50C-407E-A947-70E740481C1C}">
+                  <a14:useLocalDpi xmlns:a14="http://schemas.microsoft.com/office/drawing/2010/main" val="0"/>
+                </a:ext>
+              </a:extLst>
+            </a:blip>
+            <a:srcRect l="56389" t="57283" r="41111" b="38643"/>
+            <a:stretch/>
+          </p:blipFill>
+          <p:spPr>
+            <a:xfrm rot="19194671" flipH="1">
+              <a:off x="7121209" y="3195638"/>
+              <a:ext cx="53290" cy="65133"/>
+            </a:xfrm>
+            <a:prstGeom prst="rect">
+              <a:avLst/>
+            </a:prstGeom>
+          </p:spPr>
+        </p:pic>
+        <p:pic>
+          <p:nvPicPr>
+            <p:cNvPr id="1047" name="Immagine 1046" descr="Immagine che contiene vestiti, erba, aria aperta, cielo&#10;&#10;Descrizione generata automaticamente">
+              <a:extLst>
+                <a:ext uri="{FF2B5EF4-FFF2-40B4-BE49-F238E27FC236}">
+                  <a16:creationId xmlns:a16="http://schemas.microsoft.com/office/drawing/2014/main" id="{763EC888-8BFF-76A7-743F-C3F6FBF29313}"/>
+                </a:ext>
+              </a:extLst>
+            </p:cNvPr>
+            <p:cNvPicPr>
+              <a:picLocks noChangeAspect="1"/>
+            </p:cNvPicPr>
+            <p:nvPr/>
+          </p:nvPicPr>
+          <p:blipFill>
+            <a:blip r:embed="rId2">
+              <a:extLst>
+                <a:ext uri="{28A0092B-C50C-407E-A947-70E740481C1C}">
+                  <a14:useLocalDpi xmlns:a14="http://schemas.microsoft.com/office/drawing/2010/main" val="0"/>
+                </a:ext>
+              </a:extLst>
+            </a:blip>
+            <a:srcRect l="56389" t="57283" r="41111" b="38643"/>
+            <a:stretch/>
+          </p:blipFill>
+          <p:spPr>
+            <a:xfrm rot="19194671" flipH="1">
+              <a:off x="7157062" y="3216813"/>
+              <a:ext cx="53290" cy="65133"/>
+            </a:xfrm>
+            <a:prstGeom prst="rect">
+              <a:avLst/>
+            </a:prstGeom>
+          </p:spPr>
+        </p:pic>
+        <p:pic>
+          <p:nvPicPr>
+            <p:cNvPr id="1048" name="Immagine 1047" descr="Immagine che contiene vestiti, erba, aria aperta, cielo&#10;&#10;Descrizione generata automaticamente">
+              <a:extLst>
+                <a:ext uri="{FF2B5EF4-FFF2-40B4-BE49-F238E27FC236}">
+                  <a16:creationId xmlns:a16="http://schemas.microsoft.com/office/drawing/2014/main" id="{6F1A444A-765C-469C-5453-77647ACE3394}"/>
+                </a:ext>
+              </a:extLst>
+            </p:cNvPr>
+            <p:cNvPicPr>
+              <a:picLocks noChangeAspect="1"/>
+            </p:cNvPicPr>
+            <p:nvPr/>
+          </p:nvPicPr>
+          <p:blipFill>
+            <a:blip r:embed="rId2">
+              <a:extLst>
+                <a:ext uri="{28A0092B-C50C-407E-A947-70E740481C1C}">
+                  <a14:useLocalDpi xmlns:a14="http://schemas.microsoft.com/office/drawing/2010/main" val="0"/>
+                </a:ext>
+              </a:extLst>
+            </a:blip>
+            <a:srcRect l="56389" t="57283" r="41111" b="38643"/>
+            <a:stretch/>
+          </p:blipFill>
+          <p:spPr>
+            <a:xfrm rot="17596605" flipH="1">
+              <a:off x="7049271" y="3159249"/>
+              <a:ext cx="53290" cy="65133"/>
+            </a:xfrm>
+            <a:prstGeom prst="rect">
+              <a:avLst/>
+            </a:prstGeom>
+          </p:spPr>
+        </p:pic>
+        <p:pic>
+          <p:nvPicPr>
+            <p:cNvPr id="1051" name="Immagine 1050" descr="Immagine che contiene vestiti, erba, aria aperta, cielo&#10;&#10;Descrizione generata automaticamente">
+              <a:extLst>
+                <a:ext uri="{FF2B5EF4-FFF2-40B4-BE49-F238E27FC236}">
+                  <a16:creationId xmlns:a16="http://schemas.microsoft.com/office/drawing/2014/main" id="{14D92ACC-0E17-6904-B338-2D0625227449}"/>
+                </a:ext>
+              </a:extLst>
+            </p:cNvPr>
+            <p:cNvPicPr>
+              <a:picLocks noChangeAspect="1"/>
+            </p:cNvPicPr>
+            <p:nvPr/>
+          </p:nvPicPr>
+          <p:blipFill>
+            <a:blip r:embed="rId2">
+              <a:extLst>
+                <a:ext uri="{28A0092B-C50C-407E-A947-70E740481C1C}">
+                  <a14:useLocalDpi xmlns:a14="http://schemas.microsoft.com/office/drawing/2010/main" val="0"/>
+                </a:ext>
+              </a:extLst>
+            </a:blip>
+            <a:srcRect l="56389" t="57283" r="41111" b="38643"/>
+            <a:stretch/>
+          </p:blipFill>
+          <p:spPr>
+            <a:xfrm rot="20478371">
+              <a:off x="7183320" y="3263090"/>
+              <a:ext cx="45719" cy="55879"/>
+            </a:xfrm>
+            <a:prstGeom prst="rect">
+              <a:avLst/>
+            </a:prstGeom>
+          </p:spPr>
+        </p:pic>
+        <p:pic>
+          <p:nvPicPr>
+            <p:cNvPr id="1052" name="Immagine 1051" descr="Immagine che contiene vestiti, erba, aria aperta, cielo&#10;&#10;Descrizione generata automaticamente">
+              <a:extLst>
+                <a:ext uri="{FF2B5EF4-FFF2-40B4-BE49-F238E27FC236}">
+                  <a16:creationId xmlns:a16="http://schemas.microsoft.com/office/drawing/2014/main" id="{C3C857F3-79AD-BFFB-22C8-FDF7BC4B071D}"/>
+                </a:ext>
+              </a:extLst>
+            </p:cNvPr>
+            <p:cNvPicPr>
+              <a:picLocks noChangeAspect="1"/>
+            </p:cNvPicPr>
+            <p:nvPr/>
+          </p:nvPicPr>
+          <p:blipFill>
+            <a:blip r:embed="rId2">
+              <a:extLst>
+                <a:ext uri="{28A0092B-C50C-407E-A947-70E740481C1C}">
+                  <a14:useLocalDpi xmlns:a14="http://schemas.microsoft.com/office/drawing/2010/main" val="0"/>
+                </a:ext>
+              </a:extLst>
+            </a:blip>
+            <a:srcRect l="56389" t="57283" r="41111" b="38643"/>
+            <a:stretch/>
+          </p:blipFill>
+          <p:spPr>
+            <a:xfrm rot="169141">
+              <a:off x="7201731" y="3302232"/>
+              <a:ext cx="45719" cy="55879"/>
+            </a:xfrm>
+            <a:prstGeom prst="rect">
+              <a:avLst/>
+            </a:prstGeom>
+          </p:spPr>
+        </p:pic>
+        <p:pic>
+          <p:nvPicPr>
+            <p:cNvPr id="1053" name="Immagine 1052" descr="Immagine che contiene vestiti, erba, aria aperta, cielo&#10;&#10;Descrizione generata automaticamente">
+              <a:extLst>
+                <a:ext uri="{FF2B5EF4-FFF2-40B4-BE49-F238E27FC236}">
+                  <a16:creationId xmlns:a16="http://schemas.microsoft.com/office/drawing/2014/main" id="{93749544-671A-1C44-26EF-4C2296574A70}"/>
+                </a:ext>
+              </a:extLst>
+            </p:cNvPr>
+            <p:cNvPicPr>
+              <a:picLocks noChangeAspect="1"/>
+            </p:cNvPicPr>
+            <p:nvPr/>
+          </p:nvPicPr>
+          <p:blipFill>
+            <a:blip r:embed="rId2">
+              <a:extLst>
+                <a:ext uri="{28A0092B-C50C-407E-A947-70E740481C1C}">
+                  <a14:useLocalDpi xmlns:a14="http://schemas.microsoft.com/office/drawing/2010/main" val="0"/>
+                </a:ext>
+              </a:extLst>
+            </a:blip>
+            <a:srcRect l="56389" t="57283" r="41111" b="38643"/>
+            <a:stretch/>
+          </p:blipFill>
+          <p:spPr>
+            <a:xfrm rot="169141">
+              <a:off x="7213928" y="3340787"/>
+              <a:ext cx="45719" cy="55879"/>
+            </a:xfrm>
+            <a:prstGeom prst="rect">
+              <a:avLst/>
+            </a:prstGeom>
+          </p:spPr>
+        </p:pic>
+        <p:pic>
+          <p:nvPicPr>
+            <p:cNvPr id="1054" name="Immagine 1053" descr="Immagine che contiene vestiti, erba, aria aperta, cielo&#10;&#10;Descrizione generata automaticamente">
+              <a:extLst>
+                <a:ext uri="{FF2B5EF4-FFF2-40B4-BE49-F238E27FC236}">
+                  <a16:creationId xmlns:a16="http://schemas.microsoft.com/office/drawing/2014/main" id="{CB880A0C-F948-2394-B67F-D52458311103}"/>
+                </a:ext>
+              </a:extLst>
+            </p:cNvPr>
+            <p:cNvPicPr>
+              <a:picLocks noChangeAspect="1"/>
+            </p:cNvPicPr>
+            <p:nvPr/>
+          </p:nvPicPr>
+          <p:blipFill>
+            <a:blip r:embed="rId2">
+              <a:extLst>
+                <a:ext uri="{28A0092B-C50C-407E-A947-70E740481C1C}">
+                  <a14:useLocalDpi xmlns:a14="http://schemas.microsoft.com/office/drawing/2010/main" val="0"/>
+                </a:ext>
+              </a:extLst>
+            </a:blip>
+            <a:srcRect l="56389" t="57283" r="41111" b="38643"/>
+            <a:stretch/>
+          </p:blipFill>
+          <p:spPr>
+            <a:xfrm rot="169141">
+              <a:off x="7213929" y="3384692"/>
+              <a:ext cx="45719" cy="55879"/>
+            </a:xfrm>
+            <a:prstGeom prst="rect">
+              <a:avLst/>
+            </a:prstGeom>
+          </p:spPr>
+        </p:pic>
+      </p:grpSp>
+    </p:spTree>
+    <p:extLst>
+      <p:ext uri="{BB962C8B-B14F-4D97-AF65-F5344CB8AC3E}">
+        <p14:creationId xmlns:p14="http://schemas.microsoft.com/office/powerpoint/2010/main" val="4279776935"/>
+      </p:ext>
+    </p:extLst>
+  </p:cSld>
+  <p:clrMapOvr>
+    <a:masterClrMapping/>
+  </p:clrMapOvr>
+</p:sld>
+</file>
+
 <file path=ppt/theme/theme1.xml><?xml version="1.0" encoding="utf-8"?>
 <a:theme xmlns:a="http://schemas.openxmlformats.org/drawingml/2006/main" name="Tema di Office">
   <a:themeElements>

</xml_diff>